<commit_message>
feat: ed, altered merge poets
</commit_message>
<xml_diff>
--- a/presentation/clustering_presentation.pptx
+++ b/presentation/clustering_presentation.pptx
@@ -5,7 +5,7 @@
     <p:sldMasterId id="2147483732" r:id="rId1"/>
   </p:sldMasterIdLst>
   <p:notesMasterIdLst>
-    <p:notesMasterId r:id="rId32"/>
+    <p:notesMasterId r:id="rId36"/>
   </p:notesMasterIdLst>
   <p:sldIdLst>
     <p:sldId id="256" r:id="rId2"/>
@@ -24,20 +24,24 @@
     <p:sldId id="292" r:id="rId15"/>
     <p:sldId id="303" r:id="rId16"/>
     <p:sldId id="294" r:id="rId17"/>
-    <p:sldId id="296" r:id="rId18"/>
-    <p:sldId id="308" r:id="rId19"/>
-    <p:sldId id="295" r:id="rId20"/>
-    <p:sldId id="300" r:id="rId21"/>
-    <p:sldId id="297" r:id="rId22"/>
-    <p:sldId id="301" r:id="rId23"/>
-    <p:sldId id="309" r:id="rId24"/>
-    <p:sldId id="310" r:id="rId25"/>
-    <p:sldId id="311" r:id="rId26"/>
-    <p:sldId id="305" r:id="rId27"/>
-    <p:sldId id="307" r:id="rId28"/>
-    <p:sldId id="302" r:id="rId29"/>
-    <p:sldId id="299" r:id="rId30"/>
-    <p:sldId id="304" r:id="rId31"/>
+    <p:sldId id="312" r:id="rId18"/>
+    <p:sldId id="296" r:id="rId19"/>
+    <p:sldId id="308" r:id="rId20"/>
+    <p:sldId id="295" r:id="rId21"/>
+    <p:sldId id="300" r:id="rId22"/>
+    <p:sldId id="297" r:id="rId23"/>
+    <p:sldId id="301" r:id="rId24"/>
+    <p:sldId id="309" r:id="rId25"/>
+    <p:sldId id="310" r:id="rId26"/>
+    <p:sldId id="311" r:id="rId27"/>
+    <p:sldId id="314" r:id="rId28"/>
+    <p:sldId id="315" r:id="rId29"/>
+    <p:sldId id="317" r:id="rId30"/>
+    <p:sldId id="302" r:id="rId31"/>
+    <p:sldId id="305" r:id="rId32"/>
+    <p:sldId id="307" r:id="rId33"/>
+    <p:sldId id="299" r:id="rId34"/>
+    <p:sldId id="304" r:id="rId35"/>
   </p:sldIdLst>
   <p:sldSz cx="12192000" cy="6858000"/>
   <p:notesSz cx="6858000" cy="9144000"/>
@@ -226,7 +230,7 @@
           <a:p>
             <a:fld id="{5191E409-3F0E-F149-AA52-0AF25D227FF4}" type="datetimeFigureOut">
               <a:rPr lang="de-DE" smtClean="0"/>
-              <a:t>29.06.20</a:t>
+              <a:t>04.07.20</a:t>
             </a:fld>
             <a:endParaRPr lang="de-DE"/>
           </a:p>
@@ -1164,6 +1168,375 @@
 </p:notes>
 </file>
 
+<file path=ppt/notesSlides/notesSlide10.xml><?xml version="1.0" encoding="utf-8"?>
+<p:notes xmlns:a="http://schemas.openxmlformats.org/drawingml/2006/main" xmlns:r="http://schemas.openxmlformats.org/officeDocument/2006/relationships" xmlns:p="http://schemas.openxmlformats.org/presentationml/2006/main">
+  <p:cSld>
+    <p:spTree>
+      <p:nvGrpSpPr>
+        <p:cNvPr id="1" name=""/>
+        <p:cNvGrpSpPr/>
+        <p:nvPr/>
+      </p:nvGrpSpPr>
+      <p:grpSpPr>
+        <a:xfrm>
+          <a:off x="0" y="0"/>
+          <a:ext cx="0" cy="0"/>
+          <a:chOff x="0" y="0"/>
+          <a:chExt cx="0" cy="0"/>
+        </a:xfrm>
+      </p:grpSpPr>
+      <p:sp>
+        <p:nvSpPr>
+          <p:cNvPr id="2" name="Slide Image Placeholder 1"/>
+          <p:cNvSpPr>
+            <a:spLocks noGrp="1" noRot="1" noChangeAspect="1"/>
+          </p:cNvSpPr>
+          <p:nvPr>
+            <p:ph type="sldImg"/>
+          </p:nvPr>
+        </p:nvSpPr>
+        <p:spPr/>
+      </p:sp>
+      <p:sp>
+        <p:nvSpPr>
+          <p:cNvPr id="3" name="Notes Placeholder 2"/>
+          <p:cNvSpPr>
+            <a:spLocks noGrp="1"/>
+          </p:cNvSpPr>
+          <p:nvPr>
+            <p:ph type="body" idx="1"/>
+          </p:nvPr>
+        </p:nvSpPr>
+        <p:spPr/>
+        <p:txBody>
+          <a:bodyPr/>
+          <a:lstStyle/>
+          <a:p>
+            <a:r>
+              <a:rPr lang="de-DE" dirty="0"/>
+              <a:t>ACHTUNG: Jahre sind hier Mittelwerte der Jahre aller Gedichte des Dichters</a:t>
+            </a:r>
+          </a:p>
+          <a:p>
+            <a:r>
+              <a:rPr lang="de-DE" dirty="0"/>
+              <a:t>IN KLAMMERN: Verteilung der Großteil der Jahre</a:t>
+            </a:r>
+          </a:p>
+          <a:p>
+            <a:r>
+              <a:rPr lang="de-DE" dirty="0"/>
+              <a:t>Frühbarock: 1600-1650</a:t>
+            </a:r>
+          </a:p>
+          <a:p>
+            <a:r>
+              <a:rPr lang="de-DE" dirty="0"/>
+              <a:t>Hochbarock: 1650-1700 (1720)</a:t>
+            </a:r>
+          </a:p>
+        </p:txBody>
+      </p:sp>
+      <p:sp>
+        <p:nvSpPr>
+          <p:cNvPr id="4" name="Slide Number Placeholder 3"/>
+          <p:cNvSpPr>
+            <a:spLocks noGrp="1"/>
+          </p:cNvSpPr>
+          <p:nvPr>
+            <p:ph type="sldNum" sz="quarter" idx="5"/>
+          </p:nvPr>
+        </p:nvSpPr>
+        <p:spPr/>
+        <p:txBody>
+          <a:bodyPr/>
+          <a:lstStyle/>
+          <a:p>
+            <a:fld id="{49FFD0F6-1B54-1D42-B676-41E105B9815E}" type="slidenum">
+              <a:rPr lang="de-DE" smtClean="0"/>
+              <a:t>27</a:t>
+            </a:fld>
+            <a:endParaRPr lang="de-DE"/>
+          </a:p>
+        </p:txBody>
+      </p:sp>
+    </p:spTree>
+    <p:extLst>
+      <p:ext uri="{BB962C8B-B14F-4D97-AF65-F5344CB8AC3E}">
+        <p14:creationId xmlns:p14="http://schemas.microsoft.com/office/powerpoint/2010/main" val="1629050767"/>
+      </p:ext>
+    </p:extLst>
+  </p:cSld>
+  <p:clrMapOvr>
+    <a:masterClrMapping/>
+  </p:clrMapOvr>
+</p:notes>
+</file>
+
+<file path=ppt/notesSlides/notesSlide11.xml><?xml version="1.0" encoding="utf-8"?>
+<p:notes xmlns:a="http://schemas.openxmlformats.org/drawingml/2006/main" xmlns:r="http://schemas.openxmlformats.org/officeDocument/2006/relationships" xmlns:p="http://schemas.openxmlformats.org/presentationml/2006/main">
+  <p:cSld>
+    <p:spTree>
+      <p:nvGrpSpPr>
+        <p:cNvPr id="1" name=""/>
+        <p:cNvGrpSpPr/>
+        <p:nvPr/>
+      </p:nvGrpSpPr>
+      <p:grpSpPr>
+        <a:xfrm>
+          <a:off x="0" y="0"/>
+          <a:ext cx="0" cy="0"/>
+          <a:chOff x="0" y="0"/>
+          <a:chExt cx="0" cy="0"/>
+        </a:xfrm>
+      </p:grpSpPr>
+      <p:sp>
+        <p:nvSpPr>
+          <p:cNvPr id="2" name="Slide Image Placeholder 1"/>
+          <p:cNvSpPr>
+            <a:spLocks noGrp="1" noRot="1" noChangeAspect="1"/>
+          </p:cNvSpPr>
+          <p:nvPr>
+            <p:ph type="sldImg"/>
+          </p:nvPr>
+        </p:nvSpPr>
+        <p:spPr/>
+      </p:sp>
+      <p:sp>
+        <p:nvSpPr>
+          <p:cNvPr id="3" name="Notes Placeholder 2"/>
+          <p:cNvSpPr>
+            <a:spLocks noGrp="1"/>
+          </p:cNvSpPr>
+          <p:nvPr>
+            <p:ph type="body" idx="1"/>
+          </p:nvPr>
+        </p:nvSpPr>
+        <p:spPr/>
+        <p:txBody>
+          <a:bodyPr/>
+          <a:lstStyle/>
+          <a:p>
+            <a:r>
+              <a:rPr lang="de-DE" dirty="0"/>
+              <a:t>ACHTUNG: Jahre sind hier Mittelwerte der Jahre aller Gedichte der häufigsten Epoche des Dichters</a:t>
+            </a:r>
+          </a:p>
+        </p:txBody>
+      </p:sp>
+      <p:sp>
+        <p:nvSpPr>
+          <p:cNvPr id="4" name="Slide Number Placeholder 3"/>
+          <p:cNvSpPr>
+            <a:spLocks noGrp="1"/>
+          </p:cNvSpPr>
+          <p:nvPr>
+            <p:ph type="sldNum" sz="quarter" idx="5"/>
+          </p:nvPr>
+        </p:nvSpPr>
+        <p:spPr/>
+        <p:txBody>
+          <a:bodyPr/>
+          <a:lstStyle/>
+          <a:p>
+            <a:fld id="{49FFD0F6-1B54-1D42-B676-41E105B9815E}" type="slidenum">
+              <a:rPr lang="de-DE" smtClean="0"/>
+              <a:t>28</a:t>
+            </a:fld>
+            <a:endParaRPr lang="de-DE"/>
+          </a:p>
+        </p:txBody>
+      </p:sp>
+    </p:spTree>
+    <p:extLst>
+      <p:ext uri="{BB962C8B-B14F-4D97-AF65-F5344CB8AC3E}">
+        <p14:creationId xmlns:p14="http://schemas.microsoft.com/office/powerpoint/2010/main" val="1412957019"/>
+      </p:ext>
+    </p:extLst>
+  </p:cSld>
+  <p:clrMapOvr>
+    <a:masterClrMapping/>
+  </p:clrMapOvr>
+</p:notes>
+</file>
+
+<file path=ppt/notesSlides/notesSlide12.xml><?xml version="1.0" encoding="utf-8"?>
+<p:notes xmlns:a="http://schemas.openxmlformats.org/drawingml/2006/main" xmlns:r="http://schemas.openxmlformats.org/officeDocument/2006/relationships" xmlns:p="http://schemas.openxmlformats.org/presentationml/2006/main">
+  <p:cSld>
+    <p:spTree>
+      <p:nvGrpSpPr>
+        <p:cNvPr id="1" name=""/>
+        <p:cNvGrpSpPr/>
+        <p:nvPr/>
+      </p:nvGrpSpPr>
+      <p:grpSpPr>
+        <a:xfrm>
+          <a:off x="0" y="0"/>
+          <a:ext cx="0" cy="0"/>
+          <a:chOff x="0" y="0"/>
+          <a:chExt cx="0" cy="0"/>
+        </a:xfrm>
+      </p:grpSpPr>
+      <p:sp>
+        <p:nvSpPr>
+          <p:cNvPr id="2" name="Slide Image Placeholder 1"/>
+          <p:cNvSpPr>
+            <a:spLocks noGrp="1" noRot="1" noChangeAspect="1"/>
+          </p:cNvSpPr>
+          <p:nvPr>
+            <p:ph type="sldImg"/>
+          </p:nvPr>
+        </p:nvSpPr>
+        <p:spPr/>
+      </p:sp>
+      <p:sp>
+        <p:nvSpPr>
+          <p:cNvPr id="3" name="Notes Placeholder 2"/>
+          <p:cNvSpPr>
+            <a:spLocks noGrp="1"/>
+          </p:cNvSpPr>
+          <p:nvPr>
+            <p:ph type="body" idx="1"/>
+          </p:nvPr>
+        </p:nvSpPr>
+        <p:spPr/>
+        <p:txBody>
+          <a:bodyPr/>
+          <a:lstStyle/>
+          <a:p>
+            <a:pPr algn="l"/>
+            <a:endParaRPr lang="de-DE" dirty="0"/>
+          </a:p>
+        </p:txBody>
+      </p:sp>
+      <p:sp>
+        <p:nvSpPr>
+          <p:cNvPr id="4" name="Slide Number Placeholder 3"/>
+          <p:cNvSpPr>
+            <a:spLocks noGrp="1"/>
+          </p:cNvSpPr>
+          <p:nvPr>
+            <p:ph type="sldNum" sz="quarter" idx="5"/>
+          </p:nvPr>
+        </p:nvSpPr>
+        <p:spPr/>
+        <p:txBody>
+          <a:bodyPr/>
+          <a:lstStyle/>
+          <a:p>
+            <a:fld id="{49FFD0F6-1B54-1D42-B676-41E105B9815E}" type="slidenum">
+              <a:rPr lang="de-DE" smtClean="0"/>
+              <a:t>29</a:t>
+            </a:fld>
+            <a:endParaRPr lang="de-DE"/>
+          </a:p>
+        </p:txBody>
+      </p:sp>
+    </p:spTree>
+    <p:extLst>
+      <p:ext uri="{BB962C8B-B14F-4D97-AF65-F5344CB8AC3E}">
+        <p14:creationId xmlns:p14="http://schemas.microsoft.com/office/powerpoint/2010/main" val="3822682556"/>
+      </p:ext>
+    </p:extLst>
+  </p:cSld>
+  <p:clrMapOvr>
+    <a:masterClrMapping/>
+  </p:clrMapOvr>
+</p:notes>
+</file>
+
+<file path=ppt/notesSlides/notesSlide13.xml><?xml version="1.0" encoding="utf-8"?>
+<p:notes xmlns:a="http://schemas.openxmlformats.org/drawingml/2006/main" xmlns:r="http://schemas.openxmlformats.org/officeDocument/2006/relationships" xmlns:p="http://schemas.openxmlformats.org/presentationml/2006/main">
+  <p:cSld>
+    <p:spTree>
+      <p:nvGrpSpPr>
+        <p:cNvPr id="1" name=""/>
+        <p:cNvGrpSpPr/>
+        <p:nvPr/>
+      </p:nvGrpSpPr>
+      <p:grpSpPr>
+        <a:xfrm>
+          <a:off x="0" y="0"/>
+          <a:ext cx="0" cy="0"/>
+          <a:chOff x="0" y="0"/>
+          <a:chExt cx="0" cy="0"/>
+        </a:xfrm>
+      </p:grpSpPr>
+      <p:sp>
+        <p:nvSpPr>
+          <p:cNvPr id="2" name="Slide Image Placeholder 1"/>
+          <p:cNvSpPr>
+            <a:spLocks noGrp="1" noRot="1" noChangeAspect="1"/>
+          </p:cNvSpPr>
+          <p:nvPr>
+            <p:ph type="sldImg"/>
+          </p:nvPr>
+        </p:nvSpPr>
+        <p:spPr/>
+      </p:sp>
+      <p:sp>
+        <p:nvSpPr>
+          <p:cNvPr id="3" name="Notes Placeholder 2"/>
+          <p:cNvSpPr>
+            <a:spLocks noGrp="1"/>
+          </p:cNvSpPr>
+          <p:nvPr>
+            <p:ph type="body" idx="1"/>
+          </p:nvPr>
+        </p:nvSpPr>
+        <p:spPr/>
+        <p:txBody>
+          <a:bodyPr/>
+          <a:lstStyle/>
+          <a:p>
+            <a:r>
+              <a:rPr lang="de-DE" dirty="0"/>
+              <a:t>Dimensionsreduktion: </a:t>
+            </a:r>
+            <a:r>
+              <a:rPr lang="de-DE" b="1" dirty="0" err="1"/>
+              <a:t>TruncatedSVD</a:t>
+            </a:r>
+            <a:endParaRPr lang="de-DE" b="1" dirty="0"/>
+          </a:p>
+        </p:txBody>
+      </p:sp>
+      <p:sp>
+        <p:nvSpPr>
+          <p:cNvPr id="4" name="Slide Number Placeholder 3"/>
+          <p:cNvSpPr>
+            <a:spLocks noGrp="1"/>
+          </p:cNvSpPr>
+          <p:nvPr>
+            <p:ph type="sldNum" sz="quarter" idx="5"/>
+          </p:nvPr>
+        </p:nvSpPr>
+        <p:spPr/>
+        <p:txBody>
+          <a:bodyPr/>
+          <a:lstStyle/>
+          <a:p>
+            <a:fld id="{49FFD0F6-1B54-1D42-B676-41E105B9815E}" type="slidenum">
+              <a:rPr lang="de-DE" smtClean="0"/>
+              <a:t>32</a:t>
+            </a:fld>
+            <a:endParaRPr lang="de-DE"/>
+          </a:p>
+        </p:txBody>
+      </p:sp>
+    </p:spTree>
+    <p:extLst>
+      <p:ext uri="{BB962C8B-B14F-4D97-AF65-F5344CB8AC3E}">
+        <p14:creationId xmlns:p14="http://schemas.microsoft.com/office/powerpoint/2010/main" val="3406892848"/>
+      </p:ext>
+    </p:extLst>
+  </p:cSld>
+  <p:clrMapOvr>
+    <a:masterClrMapping/>
+  </p:clrMapOvr>
+</p:notes>
+</file>
+
 <file path=ppt/notesSlides/notesSlide2.xml><?xml version="1.0" encoding="utf-8"?>
 <p:notes xmlns:a="http://schemas.openxmlformats.org/drawingml/2006/main" xmlns:r="http://schemas.openxmlformats.org/officeDocument/2006/relationships" xmlns:p="http://schemas.openxmlformats.org/presentationml/2006/main">
   <p:cSld>
@@ -1644,6 +2017,241 @@
           <a:bodyPr/>
           <a:lstStyle/>
           <a:p>
+            <a:r>
+              <a:rPr lang="de-DE" b="1" noProof="0" dirty="0" err="1"/>
+              <a:t>Adjusted</a:t>
+            </a:r>
+            <a:r>
+              <a:rPr lang="de-DE" b="1" noProof="0" dirty="0"/>
+              <a:t> Rand Index:</a:t>
+            </a:r>
+          </a:p>
+          <a:p>
+            <a:pPr marL="171450" indent="-171450">
+              <a:buFont typeface="Arial" panose="020B0604020202020204" pitchFamily="34" charset="0"/>
+              <a:buChar char="•"/>
+            </a:pPr>
+            <a:r>
+              <a:rPr lang="de-DE" noProof="0" dirty="0"/>
+              <a:t>+1: </a:t>
+            </a:r>
+            <a:r>
+              <a:rPr lang="de-DE" sz="1200" b="0" i="0" kern="1200" noProof="0" dirty="0">
+                <a:solidFill>
+                  <a:schemeClr val="tx1"/>
+                </a:solidFill>
+                <a:effectLst/>
+                <a:latin typeface="+mn-lt"/>
+                <a:ea typeface="+mn-ea"/>
+                <a:cs typeface="+mn-cs"/>
+              </a:rPr>
+              <a:t>sehr gutes Ergebnis</a:t>
+            </a:r>
+          </a:p>
+          <a:p>
+            <a:pPr marL="171450" indent="-171450">
+              <a:buFont typeface="Arial" panose="020B0604020202020204" pitchFamily="34" charset="0"/>
+              <a:buChar char="•"/>
+            </a:pPr>
+            <a:r>
+              <a:rPr lang="de-DE" sz="1200" b="0" i="0" kern="1200" noProof="0" dirty="0">
+                <a:solidFill>
+                  <a:schemeClr val="tx1"/>
+                </a:solidFill>
+                <a:effectLst/>
+                <a:latin typeface="+mn-lt"/>
+                <a:ea typeface="+mn-ea"/>
+                <a:cs typeface="+mn-cs"/>
+              </a:rPr>
+              <a:t>0: Zufallsverteilung </a:t>
+            </a:r>
+          </a:p>
+          <a:p>
+            <a:pPr marL="171450" indent="-171450">
+              <a:buFont typeface="Arial" panose="020B0604020202020204" pitchFamily="34" charset="0"/>
+              <a:buChar char="•"/>
+            </a:pPr>
+            <a:r>
+              <a:rPr lang="de-DE" sz="1200" b="0" i="0" kern="1200" noProof="0" dirty="0">
+                <a:solidFill>
+                  <a:schemeClr val="tx1"/>
+                </a:solidFill>
+                <a:effectLst/>
+                <a:latin typeface="+mn-lt"/>
+                <a:ea typeface="+mn-ea"/>
+                <a:cs typeface="+mn-cs"/>
+              </a:rPr>
+              <a:t>-1: nicht zufälliges, aber falsches </a:t>
+            </a:r>
+            <a:r>
+              <a:rPr lang="de-DE" sz="1200" b="0" i="0" kern="1200" noProof="0" dirty="0" err="1">
+                <a:solidFill>
+                  <a:schemeClr val="tx1"/>
+                </a:solidFill>
+                <a:effectLst/>
+                <a:latin typeface="+mn-lt"/>
+                <a:ea typeface="+mn-ea"/>
+                <a:cs typeface="+mn-cs"/>
+              </a:rPr>
+              <a:t>Labeling</a:t>
+            </a:r>
+            <a:endParaRPr lang="de-DE" sz="1200" b="0" i="0" kern="1200" noProof="0" dirty="0">
+              <a:solidFill>
+                <a:schemeClr val="tx1"/>
+              </a:solidFill>
+              <a:effectLst/>
+              <a:latin typeface="+mn-lt"/>
+              <a:ea typeface="+mn-ea"/>
+              <a:cs typeface="+mn-cs"/>
+            </a:endParaRPr>
+          </a:p>
+          <a:p>
+            <a:pPr marL="171450" indent="-171450">
+              <a:buFont typeface="Arial" panose="020B0604020202020204" pitchFamily="34" charset="0"/>
+              <a:buChar char="•"/>
+            </a:pPr>
+            <a:endParaRPr lang="de-DE" sz="1200" b="0" i="0" kern="1200" noProof="0" dirty="0">
+              <a:solidFill>
+                <a:schemeClr val="tx1"/>
+              </a:solidFill>
+              <a:effectLst/>
+              <a:latin typeface="+mn-lt"/>
+              <a:ea typeface="+mn-ea"/>
+              <a:cs typeface="+mn-cs"/>
+            </a:endParaRPr>
+          </a:p>
+          <a:p>
+            <a:pPr marL="0" indent="0">
+              <a:buFont typeface="Arial" panose="020B0604020202020204" pitchFamily="34" charset="0"/>
+              <a:buNone/>
+            </a:pPr>
+            <a:r>
+              <a:rPr lang="de-DE" sz="1200" b="1" i="0" kern="1200" noProof="0" dirty="0">
+                <a:solidFill>
+                  <a:schemeClr val="tx1"/>
+                </a:solidFill>
+                <a:effectLst/>
+                <a:latin typeface="+mn-lt"/>
+                <a:ea typeface="+mn-ea"/>
+                <a:cs typeface="+mn-cs"/>
+              </a:rPr>
+              <a:t>V-</a:t>
+            </a:r>
+            <a:r>
+              <a:rPr lang="de-DE" sz="1200" b="1" i="0" kern="1200" noProof="0" dirty="0" err="1">
+                <a:solidFill>
+                  <a:schemeClr val="tx1"/>
+                </a:solidFill>
+                <a:effectLst/>
+                <a:latin typeface="+mn-lt"/>
+                <a:ea typeface="+mn-ea"/>
+                <a:cs typeface="+mn-cs"/>
+              </a:rPr>
+              <a:t>Measure</a:t>
+            </a:r>
+            <a:r>
+              <a:rPr lang="de-DE" sz="1200" b="1" i="0" kern="1200" noProof="0" dirty="0">
+                <a:solidFill>
+                  <a:schemeClr val="tx1"/>
+                </a:solidFill>
+                <a:effectLst/>
+                <a:latin typeface="+mn-lt"/>
+                <a:ea typeface="+mn-ea"/>
+                <a:cs typeface="+mn-cs"/>
+              </a:rPr>
+              <a:t>: </a:t>
+            </a:r>
+            <a:r>
+              <a:rPr lang="de-DE" sz="1200" b="0" i="0" kern="1200" noProof="0" dirty="0">
+                <a:solidFill>
+                  <a:schemeClr val="tx1"/>
+                </a:solidFill>
+                <a:effectLst/>
+                <a:latin typeface="+mn-lt"/>
+                <a:ea typeface="+mn-ea"/>
+                <a:cs typeface="+mn-cs"/>
+              </a:rPr>
+              <a:t>Harmonisches Mittel zwischen </a:t>
+            </a:r>
+            <a:r>
+              <a:rPr lang="en-GB" i="1" dirty="0">
+                <a:effectLst/>
+              </a:rPr>
+              <a:t>homogeneity</a:t>
+            </a:r>
+            <a:r>
+              <a:rPr lang="en-GB" dirty="0"/>
+              <a:t> (</a:t>
+            </a:r>
+            <a:r>
+              <a:rPr lang="en-GB" dirty="0" err="1"/>
+              <a:t>wie</a:t>
+            </a:r>
+            <a:r>
+              <a:rPr lang="en-GB" dirty="0"/>
+              <a:t> </a:t>
+            </a:r>
+            <a:r>
+              <a:rPr lang="en-GB" dirty="0" err="1"/>
+              <a:t>homogen</a:t>
+            </a:r>
+            <a:r>
+              <a:rPr lang="en-GB" dirty="0"/>
+              <a:t> </a:t>
+            </a:r>
+            <a:r>
+              <a:rPr lang="en-GB" dirty="0" err="1"/>
+              <a:t>sind</a:t>
+            </a:r>
+            <a:r>
+              <a:rPr lang="en-GB" dirty="0"/>
+              <a:t> Cluster) &amp; </a:t>
+            </a:r>
+            <a:r>
+              <a:rPr lang="en-GB" i="1" dirty="0">
+                <a:effectLst/>
+              </a:rPr>
+              <a:t>completeness</a:t>
+            </a:r>
+            <a:r>
+              <a:rPr lang="en-GB" dirty="0"/>
+              <a:t> (</a:t>
+            </a:r>
+            <a:r>
+              <a:rPr lang="en-GB" dirty="0" err="1"/>
+              <a:t>wie</a:t>
+            </a:r>
+            <a:r>
+              <a:rPr lang="en-GB" dirty="0"/>
+              <a:t> </a:t>
+            </a:r>
+            <a:r>
+              <a:rPr lang="en-GB" dirty="0" err="1"/>
+              <a:t>vollständig</a:t>
+            </a:r>
+            <a:r>
+              <a:rPr lang="en-GB" dirty="0"/>
+              <a:t> </a:t>
+            </a:r>
+            <a:r>
+              <a:rPr lang="en-GB" dirty="0" err="1"/>
+              <a:t>sind</a:t>
+            </a:r>
+            <a:r>
+              <a:rPr lang="en-GB" dirty="0"/>
+              <a:t> Cluster)</a:t>
+            </a:r>
+            <a:endParaRPr lang="de-DE" sz="1200" b="0" i="0" kern="1200" noProof="0" dirty="0">
+              <a:solidFill>
+                <a:schemeClr val="tx1"/>
+              </a:solidFill>
+              <a:effectLst/>
+              <a:latin typeface="+mn-lt"/>
+              <a:ea typeface="+mn-ea"/>
+              <a:cs typeface="+mn-cs"/>
+            </a:endParaRPr>
+          </a:p>
+          <a:p>
             <a:endParaRPr lang="de-DE" dirty="0"/>
           </a:p>
         </p:txBody>
@@ -1665,7 +2273,7 @@
           <a:p>
             <a:fld id="{49FFD0F6-1B54-1D42-B676-41E105B9815E}" type="slidenum">
               <a:rPr lang="de-DE" smtClean="0"/>
-              <a:t>19</a:t>
+              <a:t>17</a:t>
             </a:fld>
             <a:endParaRPr lang="de-DE"/>
           </a:p>
@@ -1674,7 +2282,7 @@
     </p:spTree>
     <p:extLst>
       <p:ext uri="{BB962C8B-B14F-4D97-AF65-F5344CB8AC3E}">
-        <p14:creationId xmlns:p14="http://schemas.microsoft.com/office/powerpoint/2010/main" val="348265153"/>
+        <p14:creationId xmlns:p14="http://schemas.microsoft.com/office/powerpoint/2010/main" val="1549894748"/>
       </p:ext>
     </p:extLst>
   </p:cSld>
@@ -1728,15 +2336,7 @@
           <a:bodyPr/>
           <a:lstStyle/>
           <a:p>
-            <a:r>
-              <a:rPr lang="de-DE" dirty="0"/>
-              <a:t>Dimensionsreduktion: </a:t>
-            </a:r>
-            <a:r>
-              <a:rPr lang="de-DE" b="1" dirty="0" err="1"/>
-              <a:t>TruncatedSVD</a:t>
-            </a:r>
-            <a:endParaRPr lang="de-DE" b="1" dirty="0"/>
+            <a:endParaRPr lang="de-DE" dirty="0"/>
           </a:p>
         </p:txBody>
       </p:sp>
@@ -1757,7 +2357,7 @@
           <a:p>
             <a:fld id="{49FFD0F6-1B54-1D42-B676-41E105B9815E}" type="slidenum">
               <a:rPr lang="de-DE" smtClean="0"/>
-              <a:t>21</a:t>
+              <a:t>20</a:t>
             </a:fld>
             <a:endParaRPr lang="de-DE"/>
           </a:p>
@@ -1766,7 +2366,7 @@
     </p:spTree>
     <p:extLst>
       <p:ext uri="{BB962C8B-B14F-4D97-AF65-F5344CB8AC3E}">
-        <p14:creationId xmlns:p14="http://schemas.microsoft.com/office/powerpoint/2010/main" val="618638825"/>
+        <p14:creationId xmlns:p14="http://schemas.microsoft.com/office/powerpoint/2010/main" val="348265153"/>
       </p:ext>
     </p:extLst>
   </p:cSld>
@@ -1849,7 +2449,7 @@
           <a:p>
             <a:fld id="{49FFD0F6-1B54-1D42-B676-41E105B9815E}" type="slidenum">
               <a:rPr lang="de-DE" smtClean="0"/>
-              <a:t>24</a:t>
+              <a:t>22</a:t>
             </a:fld>
             <a:endParaRPr lang="de-DE"/>
           </a:p>
@@ -1858,7 +2458,7 @@
     </p:spTree>
     <p:extLst>
       <p:ext uri="{BB962C8B-B14F-4D97-AF65-F5344CB8AC3E}">
-        <p14:creationId xmlns:p14="http://schemas.microsoft.com/office/powerpoint/2010/main" val="1312082211"/>
+        <p14:creationId xmlns:p14="http://schemas.microsoft.com/office/powerpoint/2010/main" val="618638825"/>
       </p:ext>
     </p:extLst>
   </p:cSld>
@@ -1912,15 +2512,50 @@
           <a:bodyPr/>
           <a:lstStyle/>
           <a:p>
+            <a:pPr marL="171450" indent="-171450">
+              <a:buFont typeface="Arial" panose="020B0604020202020204" pitchFamily="34" charset="0"/>
+              <a:buChar char="•"/>
+            </a:pPr>
             <a:r>
               <a:rPr lang="de-DE" dirty="0"/>
-              <a:t>Dimensionsreduktion: </a:t>
-            </a:r>
-            <a:r>
-              <a:rPr lang="de-DE" b="1" dirty="0" err="1"/>
-              <a:t>TruncatedSVD</a:t>
-            </a:r>
-            <a:endParaRPr lang="de-DE" b="1" dirty="0"/>
+              <a:t>Dichter mit 5 oder weniger Gedichten wurden entfernt </a:t>
+            </a:r>
+            <a:r>
+              <a:rPr lang="de-DE" dirty="0">
+                <a:sym typeface="Wingdings" pitchFamily="2" charset="2"/>
+              </a:rPr>
+              <a:t> um nicht nach Titeln zu </a:t>
+            </a:r>
+            <a:r>
+              <a:rPr lang="de-DE" dirty="0" err="1">
+                <a:sym typeface="Wingdings" pitchFamily="2" charset="2"/>
+              </a:rPr>
+              <a:t>clustern</a:t>
+            </a:r>
+            <a:endParaRPr lang="de-DE" dirty="0"/>
+          </a:p>
+          <a:p>
+            <a:pPr marL="171450" indent="-171450">
+              <a:buFont typeface="Arial" panose="020B0604020202020204" pitchFamily="34" charset="0"/>
+              <a:buChar char="•"/>
+            </a:pPr>
+            <a:r>
+              <a:rPr lang="de-DE" dirty="0"/>
+              <a:t>Dichter wurde häufigste Epoche aller Gedichte zugeordnet</a:t>
+            </a:r>
+          </a:p>
+          <a:p>
+            <a:pPr marL="171450" indent="-171450">
+              <a:buFont typeface="Arial" panose="020B0604020202020204" pitchFamily="34" charset="0"/>
+              <a:buChar char="•"/>
+            </a:pPr>
+            <a:r>
+              <a:rPr lang="de-DE" dirty="0"/>
+              <a:t>Dichter wurde Mittelwert aller Erscheinungsjahre der Gedichte mit der häufigsten Epoche zugeordnet</a:t>
+            </a:r>
+          </a:p>
+          <a:p>
+            <a:endParaRPr lang="de-DE" dirty="0"/>
           </a:p>
         </p:txBody>
       </p:sp>
@@ -1941,7 +2576,7 @@
           <a:p>
             <a:fld id="{49FFD0F6-1B54-1D42-B676-41E105B9815E}" type="slidenum">
               <a:rPr lang="de-DE" smtClean="0"/>
-              <a:t>27</a:t>
+              <a:t>24</a:t>
             </a:fld>
             <a:endParaRPr lang="de-DE"/>
           </a:p>
@@ -1950,7 +2585,195 @@
     </p:spTree>
     <p:extLst>
       <p:ext uri="{BB962C8B-B14F-4D97-AF65-F5344CB8AC3E}">
-        <p14:creationId xmlns:p14="http://schemas.microsoft.com/office/powerpoint/2010/main" val="3406892848"/>
+        <p14:creationId xmlns:p14="http://schemas.microsoft.com/office/powerpoint/2010/main" val="539713406"/>
+      </p:ext>
+    </p:extLst>
+  </p:cSld>
+  <p:clrMapOvr>
+    <a:masterClrMapping/>
+  </p:clrMapOvr>
+</p:notes>
+</file>
+
+<file path=ppt/notesSlides/notesSlide8.xml><?xml version="1.0" encoding="utf-8"?>
+<p:notes xmlns:a="http://schemas.openxmlformats.org/drawingml/2006/main" xmlns:r="http://schemas.openxmlformats.org/officeDocument/2006/relationships" xmlns:p="http://schemas.openxmlformats.org/presentationml/2006/main">
+  <p:cSld>
+    <p:spTree>
+      <p:nvGrpSpPr>
+        <p:cNvPr id="1" name=""/>
+        <p:cNvGrpSpPr/>
+        <p:nvPr/>
+      </p:nvGrpSpPr>
+      <p:grpSpPr>
+        <a:xfrm>
+          <a:off x="0" y="0"/>
+          <a:ext cx="0" cy="0"/>
+          <a:chOff x="0" y="0"/>
+          <a:chExt cx="0" cy="0"/>
+        </a:xfrm>
+      </p:grpSpPr>
+      <p:sp>
+        <p:nvSpPr>
+          <p:cNvPr id="2" name="Slide Image Placeholder 1"/>
+          <p:cNvSpPr>
+            <a:spLocks noGrp="1" noRot="1" noChangeAspect="1"/>
+          </p:cNvSpPr>
+          <p:nvPr>
+            <p:ph type="sldImg"/>
+          </p:nvPr>
+        </p:nvSpPr>
+        <p:spPr/>
+      </p:sp>
+      <p:sp>
+        <p:nvSpPr>
+          <p:cNvPr id="3" name="Notes Placeholder 2"/>
+          <p:cNvSpPr>
+            <a:spLocks noGrp="1"/>
+          </p:cNvSpPr>
+          <p:nvPr>
+            <p:ph type="body" idx="1"/>
+          </p:nvPr>
+        </p:nvSpPr>
+        <p:spPr/>
+        <p:txBody>
+          <a:bodyPr/>
+          <a:lstStyle/>
+          <a:p>
+            <a:r>
+              <a:rPr lang="de-DE" dirty="0"/>
+              <a:t>Dimensionsreduktion: </a:t>
+            </a:r>
+            <a:r>
+              <a:rPr lang="de-DE" b="1" dirty="0" err="1"/>
+              <a:t>TruncatedSVD</a:t>
+            </a:r>
+            <a:endParaRPr lang="de-DE" b="1" dirty="0"/>
+          </a:p>
+        </p:txBody>
+      </p:sp>
+      <p:sp>
+        <p:nvSpPr>
+          <p:cNvPr id="4" name="Slide Number Placeholder 3"/>
+          <p:cNvSpPr>
+            <a:spLocks noGrp="1"/>
+          </p:cNvSpPr>
+          <p:nvPr>
+            <p:ph type="sldNum" sz="quarter" idx="5"/>
+          </p:nvPr>
+        </p:nvSpPr>
+        <p:spPr/>
+        <p:txBody>
+          <a:bodyPr/>
+          <a:lstStyle/>
+          <a:p>
+            <a:fld id="{49FFD0F6-1B54-1D42-B676-41E105B9815E}" type="slidenum">
+              <a:rPr lang="de-DE" smtClean="0"/>
+              <a:t>25</a:t>
+            </a:fld>
+            <a:endParaRPr lang="de-DE"/>
+          </a:p>
+        </p:txBody>
+      </p:sp>
+    </p:spTree>
+    <p:extLst>
+      <p:ext uri="{BB962C8B-B14F-4D97-AF65-F5344CB8AC3E}">
+        <p14:creationId xmlns:p14="http://schemas.microsoft.com/office/powerpoint/2010/main" val="1312082211"/>
+      </p:ext>
+    </p:extLst>
+  </p:cSld>
+  <p:clrMapOvr>
+    <a:masterClrMapping/>
+  </p:clrMapOvr>
+</p:notes>
+</file>
+
+<file path=ppt/notesSlides/notesSlide9.xml><?xml version="1.0" encoding="utf-8"?>
+<p:notes xmlns:a="http://schemas.openxmlformats.org/drawingml/2006/main" xmlns:r="http://schemas.openxmlformats.org/officeDocument/2006/relationships" xmlns:p="http://schemas.openxmlformats.org/presentationml/2006/main">
+  <p:cSld>
+    <p:spTree>
+      <p:nvGrpSpPr>
+        <p:cNvPr id="1" name=""/>
+        <p:cNvGrpSpPr/>
+        <p:nvPr/>
+      </p:nvGrpSpPr>
+      <p:grpSpPr>
+        <a:xfrm>
+          <a:off x="0" y="0"/>
+          <a:ext cx="0" cy="0"/>
+          <a:chOff x="0" y="0"/>
+          <a:chExt cx="0" cy="0"/>
+        </a:xfrm>
+      </p:grpSpPr>
+      <p:sp>
+        <p:nvSpPr>
+          <p:cNvPr id="2" name="Slide Image Placeholder 1"/>
+          <p:cNvSpPr>
+            <a:spLocks noGrp="1" noRot="1" noChangeAspect="1"/>
+          </p:cNvSpPr>
+          <p:nvPr>
+            <p:ph type="sldImg"/>
+          </p:nvPr>
+        </p:nvSpPr>
+        <p:spPr/>
+      </p:sp>
+      <p:sp>
+        <p:nvSpPr>
+          <p:cNvPr id="3" name="Notes Placeholder 2"/>
+          <p:cNvSpPr>
+            <a:spLocks noGrp="1"/>
+          </p:cNvSpPr>
+          <p:nvPr>
+            <p:ph type="body" idx="1"/>
+          </p:nvPr>
+        </p:nvSpPr>
+        <p:spPr/>
+        <p:txBody>
+          <a:bodyPr/>
+          <a:lstStyle/>
+          <a:p>
+            <a:pPr algn="l"/>
+            <a:r>
+              <a:rPr lang="de-DE" dirty="0"/>
+              <a:t>K-</a:t>
+            </a:r>
+            <a:r>
+              <a:rPr lang="de-DE" dirty="0" err="1"/>
+              <a:t>Means</a:t>
+            </a:r>
+            <a:r>
+              <a:rPr lang="de-DE" dirty="0"/>
+              <a:t> auf hochdimensionale Daten</a:t>
+            </a:r>
+          </a:p>
+        </p:txBody>
+      </p:sp>
+      <p:sp>
+        <p:nvSpPr>
+          <p:cNvPr id="4" name="Slide Number Placeholder 3"/>
+          <p:cNvSpPr>
+            <a:spLocks noGrp="1"/>
+          </p:cNvSpPr>
+          <p:nvPr>
+            <p:ph type="sldNum" sz="quarter" idx="5"/>
+          </p:nvPr>
+        </p:nvSpPr>
+        <p:spPr/>
+        <p:txBody>
+          <a:bodyPr/>
+          <a:lstStyle/>
+          <a:p>
+            <a:fld id="{49FFD0F6-1B54-1D42-B676-41E105B9815E}" type="slidenum">
+              <a:rPr lang="de-DE" smtClean="0"/>
+              <a:t>26</a:t>
+            </a:fld>
+            <a:endParaRPr lang="de-DE"/>
+          </a:p>
+        </p:txBody>
+      </p:sp>
+    </p:spTree>
+    <p:extLst>
+      <p:ext uri="{BB962C8B-B14F-4D97-AF65-F5344CB8AC3E}">
+        <p14:creationId xmlns:p14="http://schemas.microsoft.com/office/powerpoint/2010/main" val="2134904752"/>
       </p:ext>
     </p:extLst>
   </p:cSld>
@@ -2116,7 +2939,7 @@
           <a:p>
             <a:fld id="{02AC24A9-CCB6-4F8D-B8DB-C2F3692CFA5A}" type="datetimeFigureOut">
               <a:rPr lang="en-US" smtClean="0"/>
-              <a:t>6/29/20</a:t>
+              <a:t>7/4/20</a:t>
             </a:fld>
             <a:endParaRPr lang="en-US" dirty="0"/>
           </a:p>
@@ -2486,7 +3309,7 @@
           <a:p>
             <a:fld id="{02AC24A9-CCB6-4F8D-B8DB-C2F3692CFA5A}" type="datetimeFigureOut">
               <a:rPr lang="en-US" smtClean="0"/>
-              <a:t>6/29/20</a:t>
+              <a:t>7/4/20</a:t>
             </a:fld>
             <a:endParaRPr lang="en-US"/>
           </a:p>
@@ -2695,7 +3518,7 @@
           <a:p>
             <a:fld id="{02AC24A9-CCB6-4F8D-B8DB-C2F3692CFA5A}" type="datetimeFigureOut">
               <a:rPr lang="en-US" smtClean="0"/>
-              <a:t>6/29/20</a:t>
+              <a:t>7/4/20</a:t>
             </a:fld>
             <a:endParaRPr lang="en-US"/>
           </a:p>
@@ -3165,7 +3988,7 @@
           <a:p>
             <a:fld id="{02AC24A9-CCB6-4F8D-B8DB-C2F3692CFA5A}" type="datetimeFigureOut">
               <a:rPr lang="en-US" smtClean="0"/>
-              <a:t>6/29/20</a:t>
+              <a:t>7/4/20</a:t>
             </a:fld>
             <a:endParaRPr lang="en-US"/>
           </a:p>
@@ -3619,7 +4442,7 @@
           <a:p>
             <a:fld id="{02AC24A9-CCB6-4F8D-B8DB-C2F3692CFA5A}" type="datetimeFigureOut">
               <a:rPr lang="en-US" smtClean="0"/>
-              <a:t>6/29/20</a:t>
+              <a:t>7/4/20</a:t>
             </a:fld>
             <a:endParaRPr lang="en-US"/>
           </a:p>
@@ -4151,7 +4974,7 @@
           <a:p>
             <a:fld id="{02AC24A9-CCB6-4F8D-B8DB-C2F3692CFA5A}" type="datetimeFigureOut">
               <a:rPr lang="en-US" smtClean="0"/>
-              <a:t>6/29/20</a:t>
+              <a:t>7/4/20</a:t>
             </a:fld>
             <a:endParaRPr lang="en-US"/>
           </a:p>
@@ -4850,7 +5673,7 @@
           <a:p>
             <a:fld id="{02AC24A9-CCB6-4F8D-B8DB-C2F3692CFA5A}" type="datetimeFigureOut">
               <a:rPr lang="en-US" smtClean="0"/>
-              <a:t>6/29/20</a:t>
+              <a:t>7/4/20</a:t>
             </a:fld>
             <a:endParaRPr lang="en-US"/>
           </a:p>
@@ -5179,7 +6002,7 @@
           <a:p>
             <a:fld id="{02AC24A9-CCB6-4F8D-B8DB-C2F3692CFA5A}" type="datetimeFigureOut">
               <a:rPr lang="en-US" smtClean="0"/>
-              <a:t>6/29/20</a:t>
+              <a:t>7/4/20</a:t>
             </a:fld>
             <a:endParaRPr lang="en-US"/>
           </a:p>
@@ -5292,7 +6115,7 @@
           <a:p>
             <a:fld id="{02AC24A9-CCB6-4F8D-B8DB-C2F3692CFA5A}" type="datetimeFigureOut">
               <a:rPr lang="en-US" smtClean="0"/>
-              <a:t>6/29/20</a:t>
+              <a:t>7/4/20</a:t>
             </a:fld>
             <a:endParaRPr lang="en-US"/>
           </a:p>
@@ -5787,7 +6610,7 @@
           <a:p>
             <a:fld id="{02AC24A9-CCB6-4F8D-B8DB-C2F3692CFA5A}" type="datetimeFigureOut">
               <a:rPr lang="en-US" smtClean="0"/>
-              <a:t>6/29/20</a:t>
+              <a:t>7/4/20</a:t>
             </a:fld>
             <a:endParaRPr lang="en-US" dirty="0"/>
           </a:p>
@@ -6264,7 +7087,7 @@
           <a:p>
             <a:fld id="{02AC24A9-CCB6-4F8D-B8DB-C2F3692CFA5A}" type="datetimeFigureOut">
               <a:rPr lang="en-US" smtClean="0"/>
-              <a:t>6/29/20</a:t>
+              <a:t>7/4/20</a:t>
             </a:fld>
             <a:endParaRPr lang="en-US"/>
           </a:p>
@@ -6507,7 +7330,7 @@
           <a:p>
             <a:fld id="{02AC24A9-CCB6-4F8D-B8DB-C2F3692CFA5A}" type="datetimeFigureOut">
               <a:rPr lang="en-US" smtClean="0"/>
-              <a:t>6/29/20</a:t>
+              <a:t>7/4/20</a:t>
             </a:fld>
             <a:endParaRPr lang="en-US"/>
           </a:p>
@@ -8635,7 +9458,7 @@
           <p:cNvPr id="2" name="Title 1">
             <a:extLst>
               <a:ext uri="{FF2B5EF4-FFF2-40B4-BE49-F238E27FC236}">
-                <a16:creationId xmlns:a16="http://schemas.microsoft.com/office/drawing/2014/main" id="{78F2E4E8-04EB-0142-91AE-BC0C88F0C119}"/>
+                <a16:creationId xmlns:a16="http://schemas.microsoft.com/office/drawing/2014/main" id="{0959BEBF-BB7C-FF49-93DA-FD44946F112E}"/>
               </a:ext>
             </a:extLst>
           </p:cNvPr>
@@ -8653,15 +9476,159 @@
           <a:p>
             <a:r>
               <a:rPr lang="de-DE" b="1" dirty="0"/>
-              <a:t>4.1.  K-</a:t>
+              <a:t>Evaluationsmaße</a:t>
+            </a:r>
+          </a:p>
+        </p:txBody>
+      </p:sp>
+      <p:sp>
+        <p:nvSpPr>
+          <p:cNvPr id="3" name="Content Placeholder 2">
+            <a:extLst>
+              <a:ext uri="{FF2B5EF4-FFF2-40B4-BE49-F238E27FC236}">
+                <a16:creationId xmlns:a16="http://schemas.microsoft.com/office/drawing/2014/main" id="{5010B43E-21CA-8A4B-AEAB-6F1A4E8612FE}"/>
+              </a:ext>
+            </a:extLst>
+          </p:cNvPr>
+          <p:cNvSpPr>
+            <a:spLocks noGrp="1"/>
+          </p:cNvSpPr>
+          <p:nvPr>
+            <p:ph idx="1"/>
+          </p:nvPr>
+        </p:nvSpPr>
+        <p:spPr/>
+        <p:txBody>
+          <a:bodyPr/>
+          <a:lstStyle/>
+          <a:p>
+            <a:r>
+              <a:rPr lang="de-DE" dirty="0" err="1"/>
+              <a:t>Adjusted</a:t>
+            </a:r>
+            <a:r>
+              <a:rPr lang="de-DE" dirty="0"/>
+              <a:t> Rand Index (kurz: </a:t>
             </a:r>
             <a:r>
               <a:rPr lang="de-DE" b="1" dirty="0" err="1"/>
-              <a:t>Means</a:t>
-            </a:r>
-            <a:r>
-              <a:rPr lang="de-DE" b="1" dirty="0"/>
-              <a:t> Experimente</a:t>
+              <a:t>ari</a:t>
+            </a:r>
+            <a:r>
+              <a:rPr lang="de-DE" dirty="0"/>
+              <a:t>)</a:t>
+            </a:r>
+          </a:p>
+          <a:p>
+            <a:r>
+              <a:rPr lang="de-DE" dirty="0"/>
+              <a:t>V-</a:t>
+            </a:r>
+            <a:r>
+              <a:rPr lang="de-DE" dirty="0" err="1"/>
+              <a:t>measure</a:t>
+            </a:r>
+            <a:r>
+              <a:rPr lang="de-DE" dirty="0"/>
+              <a:t> (kurz: </a:t>
+            </a:r>
+            <a:r>
+              <a:rPr lang="de-DE" b="1" dirty="0" err="1"/>
+              <a:t>vm</a:t>
+            </a:r>
+            <a:r>
+              <a:rPr lang="de-DE" dirty="0"/>
+              <a:t>)</a:t>
+            </a:r>
+          </a:p>
+          <a:p>
+            <a:pPr lvl="1"/>
+            <a:r>
+              <a:rPr lang="de-DE" dirty="0"/>
+              <a:t>Harmonisches Mittel zwischen </a:t>
+            </a:r>
+            <a:r>
+              <a:rPr lang="en-GB" i="1" dirty="0"/>
+              <a:t>homogeneity</a:t>
+            </a:r>
+            <a:r>
+              <a:rPr lang="en-GB" dirty="0"/>
+              <a:t> &amp; </a:t>
+            </a:r>
+            <a:r>
+              <a:rPr lang="en-GB" i="1" dirty="0"/>
+              <a:t>completeness</a:t>
+            </a:r>
+            <a:endParaRPr lang="en-GB" dirty="0"/>
+          </a:p>
+          <a:p>
+            <a:pPr lvl="1"/>
+            <a:r>
+              <a:rPr lang="en-GB" i="1" dirty="0"/>
+              <a:t>homogeneity</a:t>
+            </a:r>
+            <a:r>
+              <a:rPr lang="en-GB" dirty="0"/>
+              <a:t> (</a:t>
+            </a:r>
+            <a:r>
+              <a:rPr lang="en-GB" dirty="0" err="1"/>
+              <a:t>wie</a:t>
+            </a:r>
+            <a:r>
+              <a:rPr lang="en-GB" dirty="0"/>
+              <a:t> </a:t>
+            </a:r>
+            <a:r>
+              <a:rPr lang="en-GB" dirty="0" err="1"/>
+              <a:t>homogen</a:t>
+            </a:r>
+            <a:r>
+              <a:rPr lang="en-GB" dirty="0"/>
+              <a:t> </a:t>
+            </a:r>
+            <a:r>
+              <a:rPr lang="en-GB" dirty="0" err="1"/>
+              <a:t>sind</a:t>
+            </a:r>
+            <a:r>
+              <a:rPr lang="en-GB" dirty="0"/>
+              <a:t> Cluster)</a:t>
+            </a:r>
+          </a:p>
+          <a:p>
+            <a:pPr lvl="1"/>
+            <a:r>
+              <a:rPr lang="en-GB" i="1" dirty="0"/>
+              <a:t>completeness</a:t>
+            </a:r>
+            <a:r>
+              <a:rPr lang="en-GB" dirty="0"/>
+              <a:t> (</a:t>
+            </a:r>
+            <a:r>
+              <a:rPr lang="en-GB" dirty="0" err="1"/>
+              <a:t>wie</a:t>
+            </a:r>
+            <a:r>
+              <a:rPr lang="en-GB" dirty="0"/>
+              <a:t> </a:t>
+            </a:r>
+            <a:r>
+              <a:rPr lang="en-GB" dirty="0" err="1"/>
+              <a:t>vollständig</a:t>
+            </a:r>
+            <a:r>
+              <a:rPr lang="en-GB" dirty="0"/>
+              <a:t> </a:t>
+            </a:r>
+            <a:r>
+              <a:rPr lang="en-GB" dirty="0" err="1"/>
+              <a:t>sind</a:t>
+            </a:r>
+            <a:r>
+              <a:rPr lang="en-GB" dirty="0"/>
+              <a:t> Cluster)</a:t>
             </a:r>
           </a:p>
         </p:txBody>
@@ -8669,7 +9636,7 @@
     </p:spTree>
     <p:extLst>
       <p:ext uri="{BB962C8B-B14F-4D97-AF65-F5344CB8AC3E}">
-        <p14:creationId xmlns:p14="http://schemas.microsoft.com/office/powerpoint/2010/main" val="3778911843"/>
+        <p14:creationId xmlns:p14="http://schemas.microsoft.com/office/powerpoint/2010/main" val="228732159"/>
       </p:ext>
     </p:extLst>
   </p:cSld>
@@ -8701,6 +9668,72 @@
           <p:cNvPr id="2" name="Title 1">
             <a:extLst>
               <a:ext uri="{FF2B5EF4-FFF2-40B4-BE49-F238E27FC236}">
+                <a16:creationId xmlns:a16="http://schemas.microsoft.com/office/drawing/2014/main" id="{78F2E4E8-04EB-0142-91AE-BC0C88F0C119}"/>
+              </a:ext>
+            </a:extLst>
+          </p:cNvPr>
+          <p:cNvSpPr>
+            <a:spLocks noGrp="1"/>
+          </p:cNvSpPr>
+          <p:nvPr>
+            <p:ph type="title"/>
+          </p:nvPr>
+        </p:nvSpPr>
+        <p:spPr/>
+        <p:txBody>
+          <a:bodyPr/>
+          <a:lstStyle/>
+          <a:p>
+            <a:r>
+              <a:rPr lang="de-DE" b="1" dirty="0"/>
+              <a:t>4.1.  K-</a:t>
+            </a:r>
+            <a:r>
+              <a:rPr lang="de-DE" b="1" dirty="0" err="1"/>
+              <a:t>Means</a:t>
+            </a:r>
+            <a:r>
+              <a:rPr lang="de-DE" b="1" dirty="0"/>
+              <a:t> Experimente</a:t>
+            </a:r>
+          </a:p>
+        </p:txBody>
+      </p:sp>
+    </p:spTree>
+    <p:extLst>
+      <p:ext uri="{BB962C8B-B14F-4D97-AF65-F5344CB8AC3E}">
+        <p14:creationId xmlns:p14="http://schemas.microsoft.com/office/powerpoint/2010/main" val="3778911843"/>
+      </p:ext>
+    </p:extLst>
+  </p:cSld>
+  <p:clrMapOvr>
+    <a:masterClrMapping/>
+  </p:clrMapOvr>
+</p:sld>
+</file>
+
+<file path=ppt/slides/slide19.xml><?xml version="1.0" encoding="utf-8"?>
+<p:sld xmlns:a="http://schemas.openxmlformats.org/drawingml/2006/main" xmlns:r="http://schemas.openxmlformats.org/officeDocument/2006/relationships" xmlns:p="http://schemas.openxmlformats.org/presentationml/2006/main" show="0">
+  <p:cSld>
+    <p:spTree>
+      <p:nvGrpSpPr>
+        <p:cNvPr id="1" name=""/>
+        <p:cNvGrpSpPr/>
+        <p:nvPr/>
+      </p:nvGrpSpPr>
+      <p:grpSpPr>
+        <a:xfrm>
+          <a:off x="0" y="0"/>
+          <a:ext cx="0" cy="0"/>
+          <a:chOff x="0" y="0"/>
+          <a:chExt cx="0" cy="0"/>
+        </a:xfrm>
+      </p:grpSpPr>
+      <p:sp>
+        <p:nvSpPr>
+          <p:cNvPr id="2" name="Title 1">
+            <a:extLst>
+              <a:ext uri="{FF2B5EF4-FFF2-40B4-BE49-F238E27FC236}">
                 <a16:creationId xmlns:a16="http://schemas.microsoft.com/office/drawing/2014/main" id="{DCBE102F-D2BB-3946-AEF1-AE93DF5165E5}"/>
               </a:ext>
             </a:extLst>
@@ -8739,8 +9772,134 @@
 </p:sld>
 </file>
 
-<file path=ppt/slides/slide19.xml><?xml version="1.0" encoding="utf-8"?>
+<file path=ppt/slides/slide2.xml><?xml version="1.0" encoding="utf-8"?>
 <p:sld xmlns:a="http://schemas.openxmlformats.org/drawingml/2006/main" xmlns:r="http://schemas.openxmlformats.org/officeDocument/2006/relationships" xmlns:p="http://schemas.openxmlformats.org/presentationml/2006/main">
+  <p:cSld>
+    <p:spTree>
+      <p:nvGrpSpPr>
+        <p:cNvPr id="1" name=""/>
+        <p:cNvGrpSpPr/>
+        <p:nvPr/>
+      </p:nvGrpSpPr>
+      <p:grpSpPr>
+        <a:xfrm>
+          <a:off x="0" y="0"/>
+          <a:ext cx="0" cy="0"/>
+          <a:chOff x="0" y="0"/>
+          <a:chExt cx="0" cy="0"/>
+        </a:xfrm>
+      </p:grpSpPr>
+      <p:sp>
+        <p:nvSpPr>
+          <p:cNvPr id="2" name="Title 1">
+            <a:extLst>
+              <a:ext uri="{FF2B5EF4-FFF2-40B4-BE49-F238E27FC236}">
+                <a16:creationId xmlns:a16="http://schemas.microsoft.com/office/drawing/2014/main" id="{ABBD1032-7C21-EB45-88CD-39E1CDFCEED7}"/>
+              </a:ext>
+            </a:extLst>
+          </p:cNvPr>
+          <p:cNvSpPr>
+            <a:spLocks noGrp="1"/>
+          </p:cNvSpPr>
+          <p:nvPr>
+            <p:ph type="title"/>
+          </p:nvPr>
+        </p:nvSpPr>
+        <p:spPr/>
+        <p:txBody>
+          <a:bodyPr/>
+          <a:lstStyle/>
+          <a:p>
+            <a:r>
+              <a:rPr lang="en-DE" dirty="0"/>
+              <a:t>Übersicht</a:t>
+            </a:r>
+          </a:p>
+        </p:txBody>
+      </p:sp>
+      <p:sp>
+        <p:nvSpPr>
+          <p:cNvPr id="3" name="Content Placeholder 2">
+            <a:extLst>
+              <a:ext uri="{FF2B5EF4-FFF2-40B4-BE49-F238E27FC236}">
+                <a16:creationId xmlns:a16="http://schemas.microsoft.com/office/drawing/2014/main" id="{80899769-BBF7-274C-B579-0AE87166EDED}"/>
+              </a:ext>
+            </a:extLst>
+          </p:cNvPr>
+          <p:cNvSpPr>
+            <a:spLocks noGrp="1"/>
+          </p:cNvSpPr>
+          <p:nvPr>
+            <p:ph idx="1"/>
+          </p:nvPr>
+        </p:nvSpPr>
+        <p:spPr/>
+        <p:txBody>
+          <a:bodyPr/>
+          <a:lstStyle/>
+          <a:p>
+            <a:pPr marL="514350" indent="-514350">
+              <a:buAutoNum type="arabicPeriod"/>
+            </a:pPr>
+            <a:r>
+              <a:rPr lang="en-DE" dirty="0"/>
+              <a:t>Kurzer Überblick zum Epochenbegriff und –einteilung</a:t>
+            </a:r>
+          </a:p>
+          <a:p>
+            <a:pPr marL="514350" indent="-514350">
+              <a:buAutoNum type="arabicPeriod"/>
+            </a:pPr>
+            <a:r>
+              <a:rPr lang="en-DE" dirty="0"/>
+              <a:t>Das Korpus</a:t>
+            </a:r>
+          </a:p>
+          <a:p>
+            <a:pPr marL="514350" indent="-514350">
+              <a:buAutoNum type="arabicPeriod"/>
+            </a:pPr>
+            <a:r>
+              <a:rPr lang="en-GB" dirty="0" err="1"/>
+              <a:t>Fragestellungen</a:t>
+            </a:r>
+            <a:endParaRPr lang="en-DE" dirty="0"/>
+          </a:p>
+          <a:p>
+            <a:pPr marL="514350" indent="-514350">
+              <a:buAutoNum type="arabicPeriod"/>
+            </a:pPr>
+            <a:r>
+              <a:rPr lang="en-DE" dirty="0"/>
+              <a:t>Experimente</a:t>
+            </a:r>
+          </a:p>
+          <a:p>
+            <a:pPr marL="514350" indent="-514350">
+              <a:buAutoNum type="arabicPeriod"/>
+            </a:pPr>
+            <a:r>
+              <a:rPr lang="en-DE" dirty="0"/>
+              <a:t>Schlussbetrachtung</a:t>
+            </a:r>
+          </a:p>
+        </p:txBody>
+      </p:sp>
+    </p:spTree>
+    <p:extLst>
+      <p:ext uri="{BB962C8B-B14F-4D97-AF65-F5344CB8AC3E}">
+        <p14:creationId xmlns:p14="http://schemas.microsoft.com/office/powerpoint/2010/main" val="2653683036"/>
+      </p:ext>
+    </p:extLst>
+  </p:cSld>
+  <p:clrMapOvr>
+    <a:masterClrMapping/>
+  </p:clrMapOvr>
+</p:sld>
+</file>
+
+<file path=ppt/slides/slide20.xml><?xml version="1.0" encoding="utf-8"?>
+<p:sld xmlns:a="http://schemas.openxmlformats.org/drawingml/2006/main" xmlns:r="http://schemas.openxmlformats.org/officeDocument/2006/relationships" xmlns:p="http://schemas.openxmlformats.org/presentationml/2006/main" show="0">
   <p:cSld>
     <p:bg>
       <p:bgPr>
@@ -9961,134 +11120,8 @@
 </p:sld>
 </file>
 
-<file path=ppt/slides/slide2.xml><?xml version="1.0" encoding="utf-8"?>
-<p:sld xmlns:a="http://schemas.openxmlformats.org/drawingml/2006/main" xmlns:r="http://schemas.openxmlformats.org/officeDocument/2006/relationships" xmlns:p="http://schemas.openxmlformats.org/presentationml/2006/main">
-  <p:cSld>
-    <p:spTree>
-      <p:nvGrpSpPr>
-        <p:cNvPr id="1" name=""/>
-        <p:cNvGrpSpPr/>
-        <p:nvPr/>
-      </p:nvGrpSpPr>
-      <p:grpSpPr>
-        <a:xfrm>
-          <a:off x="0" y="0"/>
-          <a:ext cx="0" cy="0"/>
-          <a:chOff x="0" y="0"/>
-          <a:chExt cx="0" cy="0"/>
-        </a:xfrm>
-      </p:grpSpPr>
-      <p:sp>
-        <p:nvSpPr>
-          <p:cNvPr id="2" name="Title 1">
-            <a:extLst>
-              <a:ext uri="{FF2B5EF4-FFF2-40B4-BE49-F238E27FC236}">
-                <a16:creationId xmlns:a16="http://schemas.microsoft.com/office/drawing/2014/main" id="{ABBD1032-7C21-EB45-88CD-39E1CDFCEED7}"/>
-              </a:ext>
-            </a:extLst>
-          </p:cNvPr>
-          <p:cNvSpPr>
-            <a:spLocks noGrp="1"/>
-          </p:cNvSpPr>
-          <p:nvPr>
-            <p:ph type="title"/>
-          </p:nvPr>
-        </p:nvSpPr>
-        <p:spPr/>
-        <p:txBody>
-          <a:bodyPr/>
-          <a:lstStyle/>
-          <a:p>
-            <a:r>
-              <a:rPr lang="en-DE" dirty="0"/>
-              <a:t>Übersicht</a:t>
-            </a:r>
-          </a:p>
-        </p:txBody>
-      </p:sp>
-      <p:sp>
-        <p:nvSpPr>
-          <p:cNvPr id="3" name="Content Placeholder 2">
-            <a:extLst>
-              <a:ext uri="{FF2B5EF4-FFF2-40B4-BE49-F238E27FC236}">
-                <a16:creationId xmlns:a16="http://schemas.microsoft.com/office/drawing/2014/main" id="{80899769-BBF7-274C-B579-0AE87166EDED}"/>
-              </a:ext>
-            </a:extLst>
-          </p:cNvPr>
-          <p:cNvSpPr>
-            <a:spLocks noGrp="1"/>
-          </p:cNvSpPr>
-          <p:nvPr>
-            <p:ph idx="1"/>
-          </p:nvPr>
-        </p:nvSpPr>
-        <p:spPr/>
-        <p:txBody>
-          <a:bodyPr/>
-          <a:lstStyle/>
-          <a:p>
-            <a:pPr marL="514350" indent="-514350">
-              <a:buAutoNum type="arabicPeriod"/>
-            </a:pPr>
-            <a:r>
-              <a:rPr lang="en-DE" dirty="0"/>
-              <a:t>Kurzer Überblick zum Epochenbegriff und –einteilung</a:t>
-            </a:r>
-          </a:p>
-          <a:p>
-            <a:pPr marL="514350" indent="-514350">
-              <a:buAutoNum type="arabicPeriod"/>
-            </a:pPr>
-            <a:r>
-              <a:rPr lang="en-DE" dirty="0"/>
-              <a:t>Das Korpus</a:t>
-            </a:r>
-          </a:p>
-          <a:p>
-            <a:pPr marL="514350" indent="-514350">
-              <a:buAutoNum type="arabicPeriod"/>
-            </a:pPr>
-            <a:r>
-              <a:rPr lang="en-GB" dirty="0" err="1"/>
-              <a:t>Fragestellungen</a:t>
-            </a:r>
-            <a:endParaRPr lang="en-DE" dirty="0"/>
-          </a:p>
-          <a:p>
-            <a:pPr marL="514350" indent="-514350">
-              <a:buAutoNum type="arabicPeriod"/>
-            </a:pPr>
-            <a:r>
-              <a:rPr lang="en-DE" dirty="0"/>
-              <a:t>Experimente</a:t>
-            </a:r>
-          </a:p>
-          <a:p>
-            <a:pPr marL="514350" indent="-514350">
-              <a:buAutoNum type="arabicPeriod"/>
-            </a:pPr>
-            <a:r>
-              <a:rPr lang="en-DE" dirty="0"/>
-              <a:t>Schlussbetrachtung</a:t>
-            </a:r>
-          </a:p>
-        </p:txBody>
-      </p:sp>
-    </p:spTree>
-    <p:extLst>
-      <p:ext uri="{BB962C8B-B14F-4D97-AF65-F5344CB8AC3E}">
-        <p14:creationId xmlns:p14="http://schemas.microsoft.com/office/powerpoint/2010/main" val="2653683036"/>
-      </p:ext>
-    </p:extLst>
-  </p:cSld>
-  <p:clrMapOvr>
-    <a:masterClrMapping/>
-  </p:clrMapOvr>
-</p:sld>
-</file>
-
-<file path=ppt/slides/slide20.xml><?xml version="1.0" encoding="utf-8"?>
-<p:sld xmlns:a="http://schemas.openxmlformats.org/drawingml/2006/main" xmlns:r="http://schemas.openxmlformats.org/officeDocument/2006/relationships" xmlns:p="http://schemas.openxmlformats.org/presentationml/2006/main">
+<file path=ppt/slides/slide21.xml><?xml version="1.0" encoding="utf-8"?>
+<p:sld xmlns:a="http://schemas.openxmlformats.org/drawingml/2006/main" xmlns:r="http://schemas.openxmlformats.org/officeDocument/2006/relationships" xmlns:p="http://schemas.openxmlformats.org/presentationml/2006/main" show="0">
   <p:cSld>
     <p:spTree>
       <p:nvGrpSpPr>
@@ -11289,7 +12322,7 @@
 </p:sld>
 </file>
 
-<file path=ppt/slides/slide21.xml><?xml version="1.0" encoding="utf-8"?>
+<file path=ppt/slides/slide22.xml><?xml version="1.0" encoding="utf-8"?>
 <p:sld xmlns:a="http://schemas.openxmlformats.org/drawingml/2006/main" xmlns:r="http://schemas.openxmlformats.org/officeDocument/2006/relationships" xmlns:p="http://schemas.openxmlformats.org/presentationml/2006/main">
   <p:cSld>
     <p:bg>
@@ -12304,8 +13337,8 @@
 </p:sld>
 </file>
 
-<file path=ppt/slides/slide22.xml><?xml version="1.0" encoding="utf-8"?>
-<p:sld xmlns:a="http://schemas.openxmlformats.org/drawingml/2006/main" xmlns:r="http://schemas.openxmlformats.org/officeDocument/2006/relationships" xmlns:p="http://schemas.openxmlformats.org/presentationml/2006/main">
+<file path=ppt/slides/slide23.xml><?xml version="1.0" encoding="utf-8"?>
+<p:sld xmlns:a="http://schemas.openxmlformats.org/drawingml/2006/main" xmlns:r="http://schemas.openxmlformats.org/officeDocument/2006/relationships" xmlns:p="http://schemas.openxmlformats.org/presentationml/2006/main" show="0">
   <p:cSld>
     <p:spTree>
       <p:nvGrpSpPr>
@@ -13507,7 +14540,7 @@
 </p:sld>
 </file>
 
-<file path=ppt/slides/slide23.xml><?xml version="1.0" encoding="utf-8"?>
+<file path=ppt/slides/slide24.xml><?xml version="1.0" encoding="utf-8"?>
 <p:sld xmlns:a="http://schemas.openxmlformats.org/drawingml/2006/main" xmlns:r="http://schemas.openxmlformats.org/officeDocument/2006/relationships" xmlns:p="http://schemas.openxmlformats.org/presentationml/2006/main">
   <p:cSld>
     <p:spTree>
@@ -13568,7 +14601,7 @@
 </p:sld>
 </file>
 
-<file path=ppt/slides/slide24.xml><?xml version="1.0" encoding="utf-8"?>
+<file path=ppt/slides/slide25.xml><?xml version="1.0" encoding="utf-8"?>
 <p:sld xmlns:a="http://schemas.openxmlformats.org/drawingml/2006/main" xmlns:r="http://schemas.openxmlformats.org/officeDocument/2006/relationships" xmlns:p="http://schemas.openxmlformats.org/presentationml/2006/main">
   <p:cSld>
     <p:bg>
@@ -14123,7 +15156,7 @@
           <p:nvPr>
             <p:extLst>
               <p:ext uri="{D42A27DB-BD31-4B8C-83A1-F6EECF244321}">
-                <p14:modId xmlns:p14="http://schemas.microsoft.com/office/powerpoint/2010/main" val="2451127855"/>
+                <p14:modId xmlns:p14="http://schemas.microsoft.com/office/powerpoint/2010/main" val="306931789"/>
               </p:ext>
             </p:extLst>
           </p:nvPr>
@@ -14257,7 +15290,7 @@
                         <a:rPr lang="en-DE" sz="2700" dirty="0">
                           <a:effectLst/>
                         </a:rPr>
-                        <a:t>0.850065</a:t>
+                        <a:t>0.843127</a:t>
                       </a:r>
                     </a:p>
                   </a:txBody>
@@ -14270,10 +15303,10 @@
                     <a:p>
                       <a:pPr algn="r" fontAlgn="ctr"/>
                       <a:r>
-                        <a:rPr lang="en-DE" sz="2700">
+                        <a:rPr lang="en-DE" sz="2700" dirty="0">
                           <a:effectLst/>
                         </a:rPr>
-                        <a:t>0.787506</a:t>
+                        <a:t>0.781205</a:t>
                       </a:r>
                     </a:p>
                   </a:txBody>
@@ -14558,7 +15591,7 @@
 </p:sld>
 </file>
 
-<file path=ppt/slides/slide25.xml><?xml version="1.0" encoding="utf-8"?>
+<file path=ppt/slides/slide26.xml><?xml version="1.0" encoding="utf-8"?>
 <p:sld xmlns:a="http://schemas.openxmlformats.org/drawingml/2006/main" xmlns:r="http://schemas.openxmlformats.org/officeDocument/2006/relationships" xmlns:p="http://schemas.openxmlformats.org/presentationml/2006/main">
   <p:cSld>
     <p:bg>
@@ -15070,37 +16103,6 @@
           </a:p>
         </p:txBody>
       </p:sp>
-      <p:pic>
-        <p:nvPicPr>
-          <p:cNvPr id="5" name="Content Placeholder 4" descr="A screenshot of a cell phone&#10;&#10;Description automatically generated">
-            <a:extLst>
-              <a:ext uri="{FF2B5EF4-FFF2-40B4-BE49-F238E27FC236}">
-                <a16:creationId xmlns:a16="http://schemas.microsoft.com/office/drawing/2014/main" id="{3064F7C2-C534-6E4E-A480-2CBF93F3C735}"/>
-              </a:ext>
-            </a:extLst>
-          </p:cNvPr>
-          <p:cNvPicPr>
-            <a:picLocks noGrp="1" noChangeAspect="1"/>
-          </p:cNvPicPr>
-          <p:nvPr>
-            <p:ph idx="1"/>
-          </p:nvPr>
-        </p:nvPicPr>
-        <p:blipFill rotWithShape="1">
-          <a:blip r:embed="rId2"/>
-          <a:srcRect l="10299" t="6822" r="9887" b="8902"/>
-          <a:stretch/>
-        </p:blipFill>
-        <p:spPr>
-          <a:xfrm>
-            <a:off x="4979322" y="843726"/>
-            <a:ext cx="7122605" cy="5170548"/>
-          </a:xfrm>
-          <a:prstGeom prst="rect">
-            <a:avLst/>
-          </a:prstGeom>
-        </p:spPr>
-      </p:pic>
       <p:sp>
         <p:nvSpPr>
           <p:cNvPr id="6" name="TextBox 5">
@@ -15131,22 +16133,46 @@
           <a:p>
             <a:r>
               <a:rPr lang="de-DE" sz="2400" dirty="0"/>
-              <a:t>Dichter Barock: </a:t>
-            </a:r>
-            <a:r>
-              <a:rPr lang="de-DE" sz="2400"/>
-              <a:t>	36</a:t>
-            </a:r>
-            <a:endParaRPr lang="de-DE" sz="2400" dirty="0"/>
+              <a:t>Dichter Barock: 	35</a:t>
+            </a:r>
           </a:p>
           <a:p>
             <a:r>
               <a:rPr lang="de-DE" sz="2400" dirty="0"/>
-              <a:t>Dichter Realismus:  	69</a:t>
+              <a:t>Dichter Realismus:  	65</a:t>
             </a:r>
           </a:p>
         </p:txBody>
       </p:sp>
+      <p:pic>
+        <p:nvPicPr>
+          <p:cNvPr id="19" name="Picture 18" descr="A screenshot of a cell phone&#10;&#10;Description automatically generated">
+            <a:extLst>
+              <a:ext uri="{FF2B5EF4-FFF2-40B4-BE49-F238E27FC236}">
+                <a16:creationId xmlns:a16="http://schemas.microsoft.com/office/drawing/2014/main" id="{B94AA61E-BF36-0E4B-B088-22FE4A336506}"/>
+              </a:ext>
+            </a:extLst>
+          </p:cNvPr>
+          <p:cNvPicPr>
+            <a:picLocks noChangeAspect="1"/>
+          </p:cNvPicPr>
+          <p:nvPr/>
+        </p:nvPicPr>
+        <p:blipFill rotWithShape="1">
+          <a:blip r:embed="rId3"/>
+          <a:srcRect l="10763" t="6647" r="16840" b="9707"/>
+          <a:stretch/>
+        </p:blipFill>
+        <p:spPr>
+          <a:xfrm>
+            <a:off x="4548628" y="413290"/>
+            <a:ext cx="7593036" cy="6031419"/>
+          </a:xfrm>
+          <a:prstGeom prst="rect">
+            <a:avLst/>
+          </a:prstGeom>
+        </p:spPr>
+      </p:pic>
     </p:spTree>
     <p:extLst>
       <p:ext uri="{BB962C8B-B14F-4D97-AF65-F5344CB8AC3E}">
@@ -15160,7 +16186,1961 @@
 </p:sld>
 </file>
 
-<file path=ppt/slides/slide26.xml><?xml version="1.0" encoding="utf-8"?>
+<file path=ppt/slides/slide27.xml><?xml version="1.0" encoding="utf-8"?>
+<p:sld xmlns:a="http://schemas.openxmlformats.org/drawingml/2006/main" xmlns:r="http://schemas.openxmlformats.org/officeDocument/2006/relationships" xmlns:p="http://schemas.openxmlformats.org/presentationml/2006/main">
+  <p:cSld>
+    <p:bg>
+      <p:bgPr>
+        <a:solidFill>
+          <a:schemeClr val="bg1"/>
+        </a:solidFill>
+        <a:effectLst/>
+      </p:bgPr>
+    </p:bg>
+    <p:spTree>
+      <p:nvGrpSpPr>
+        <p:cNvPr id="1" name=""/>
+        <p:cNvGrpSpPr/>
+        <p:nvPr/>
+      </p:nvGrpSpPr>
+      <p:grpSpPr>
+        <a:xfrm>
+          <a:off x="0" y="0"/>
+          <a:ext cx="0" cy="0"/>
+          <a:chOff x="0" y="0"/>
+          <a:chExt cx="0" cy="0"/>
+        </a:xfrm>
+      </p:grpSpPr>
+      <p:sp useBgFill="1">
+        <p:nvSpPr>
+          <p:cNvPr id="50" name="Rectangle 49">
+            <a:extLst>
+              <a:ext uri="{FF2B5EF4-FFF2-40B4-BE49-F238E27FC236}">
+                <a16:creationId xmlns:a16="http://schemas.microsoft.com/office/drawing/2014/main" id="{2C9A9DA9-7DC8-488B-A882-123947B0F3D9}"/>
+              </a:ext>
+              <a:ext uri="{C183D7F6-B498-43B3-948B-1728B52AA6E4}">
+                <adec:decorative xmlns:adec="http://schemas.microsoft.com/office/drawing/2017/decorative" val="1"/>
+              </a:ext>
+            </a:extLst>
+          </p:cNvPr>
+          <p:cNvSpPr>
+            <a:spLocks noGrp="1" noRot="1" noChangeAspect="1" noMove="1" noResize="1" noEditPoints="1" noAdjustHandles="1" noChangeArrowheads="1" noChangeShapeType="1" noTextEdit="1"/>
+          </p:cNvSpPr>
+          <p:nvPr>
+            <p:extLst>
+              <p:ext uri="{386F3935-93C4-4BCD-93E2-E3B085C9AB24}">
+                <p16:designElem xmlns:p16="http://schemas.microsoft.com/office/powerpoint/2015/main" val="1"/>
+              </p:ext>
+            </p:extLst>
+          </p:nvPr>
+        </p:nvSpPr>
+        <p:spPr>
+          <a:xfrm>
+            <a:off x="0" y="0"/>
+            <a:ext cx="12192000" cy="6858000"/>
+          </a:xfrm>
+          <a:prstGeom prst="rect">
+            <a:avLst/>
+          </a:prstGeom>
+          <a:ln>
+            <a:noFill/>
+          </a:ln>
+        </p:spPr>
+        <p:style>
+          <a:lnRef idx="2">
+            <a:schemeClr val="accent1">
+              <a:shade val="50000"/>
+            </a:schemeClr>
+          </a:lnRef>
+          <a:fillRef idx="1">
+            <a:schemeClr val="accent1"/>
+          </a:fillRef>
+          <a:effectRef idx="0">
+            <a:schemeClr val="accent1"/>
+          </a:effectRef>
+          <a:fontRef idx="minor">
+            <a:schemeClr val="lt1"/>
+          </a:fontRef>
+        </p:style>
+        <p:txBody>
+          <a:bodyPr rtlCol="0" anchor="ctr"/>
+          <a:lstStyle/>
+          <a:p>
+            <a:pPr algn="ctr"/>
+            <a:endParaRPr lang="en-US"/>
+          </a:p>
+        </p:txBody>
+      </p:sp>
+      <p:sp useBgFill="1">
+        <p:nvSpPr>
+          <p:cNvPr id="52" name="Rectangle 51">
+            <a:extLst>
+              <a:ext uri="{FF2B5EF4-FFF2-40B4-BE49-F238E27FC236}">
+                <a16:creationId xmlns:a16="http://schemas.microsoft.com/office/drawing/2014/main" id="{57F6BDD4-E066-4008-8011-6CC31AEB4556}"/>
+              </a:ext>
+              <a:ext uri="{C183D7F6-B498-43B3-948B-1728B52AA6E4}">
+                <adec:decorative xmlns:adec="http://schemas.microsoft.com/office/drawing/2017/decorative" val="1"/>
+              </a:ext>
+            </a:extLst>
+          </p:cNvPr>
+          <p:cNvSpPr>
+            <a:spLocks noGrp="1" noRot="1" noChangeAspect="1" noMove="1" noResize="1" noEditPoints="1" noAdjustHandles="1" noChangeArrowheads="1" noChangeShapeType="1" noTextEdit="1"/>
+          </p:cNvSpPr>
+          <p:nvPr>
+            <p:extLst>
+              <p:ext uri="{386F3935-93C4-4BCD-93E2-E3B085C9AB24}">
+                <p16:designElem xmlns:p16="http://schemas.microsoft.com/office/powerpoint/2015/main" val="1"/>
+              </p:ext>
+            </p:extLst>
+          </p:nvPr>
+        </p:nvSpPr>
+        <p:spPr>
+          <a:xfrm>
+            <a:off x="409575" y="633619"/>
+            <a:ext cx="4279383" cy="5495925"/>
+          </a:xfrm>
+          <a:prstGeom prst="rect">
+            <a:avLst/>
+          </a:prstGeom>
+          <a:ln w="9525">
+            <a:solidFill>
+              <a:schemeClr val="tx2">
+                <a:lumMod val="10000"/>
+                <a:lumOff val="90000"/>
+              </a:schemeClr>
+            </a:solidFill>
+          </a:ln>
+          <a:effectLst>
+            <a:outerShdw blurRad="50800" dist="38100" dir="2700000" algn="tl" rotWithShape="0">
+              <a:schemeClr val="bg1">
+                <a:lumMod val="85000"/>
+                <a:alpha val="30000"/>
+              </a:schemeClr>
+            </a:outerShdw>
+          </a:effectLst>
+        </p:spPr>
+        <p:style>
+          <a:lnRef idx="2">
+            <a:schemeClr val="accent1">
+              <a:shade val="50000"/>
+            </a:schemeClr>
+          </a:lnRef>
+          <a:fillRef idx="1">
+            <a:schemeClr val="accent1"/>
+          </a:fillRef>
+          <a:effectRef idx="0">
+            <a:schemeClr val="accent1"/>
+          </a:effectRef>
+          <a:fontRef idx="minor">
+            <a:schemeClr val="lt1"/>
+          </a:fontRef>
+        </p:style>
+        <p:txBody>
+          <a:bodyPr rtlCol="0" anchor="ctr"/>
+          <a:lstStyle/>
+          <a:p>
+            <a:pPr marL="0" marR="0" lvl="0" indent="0" algn="ctr" defTabSz="914400" rtl="0" eaLnBrk="1" fontAlgn="auto" latinLnBrk="0" hangingPunct="1">
+              <a:lnSpc>
+                <a:spcPct val="100000"/>
+              </a:lnSpc>
+              <a:spcBef>
+                <a:spcPts val="0"/>
+              </a:spcBef>
+              <a:spcAft>
+                <a:spcPts val="0"/>
+              </a:spcAft>
+              <a:buClrTx/>
+              <a:buSzTx/>
+              <a:buFontTx/>
+              <a:buNone/>
+              <a:tabLst/>
+              <a:defRPr/>
+            </a:pPr>
+            <a:endParaRPr kumimoji="0" lang="en-US" sz="1800" b="0" i="0" u="none" strike="noStrike" kern="1200" cap="none" spc="0" normalizeH="0" baseline="0" noProof="0">
+              <a:ln>
+                <a:noFill/>
+              </a:ln>
+              <a:solidFill>
+                <a:prstClr val="white"/>
+              </a:solidFill>
+              <a:effectLst/>
+              <a:uLnTx/>
+              <a:uFillTx/>
+              <a:latin typeface="Calibri" panose="020F0502020204030204"/>
+              <a:ea typeface="+mn-ea"/>
+              <a:cs typeface="+mn-cs"/>
+            </a:endParaRPr>
+          </a:p>
+        </p:txBody>
+      </p:sp>
+      <p:sp>
+        <p:nvSpPr>
+          <p:cNvPr id="2" name="Title 1">
+            <a:extLst>
+              <a:ext uri="{FF2B5EF4-FFF2-40B4-BE49-F238E27FC236}">
+                <a16:creationId xmlns:a16="http://schemas.microsoft.com/office/drawing/2014/main" id="{54ADA480-6AB0-844F-9E88-B8120036CC75}"/>
+              </a:ext>
+            </a:extLst>
+          </p:cNvPr>
+          <p:cNvSpPr>
+            <a:spLocks noGrp="1"/>
+          </p:cNvSpPr>
+          <p:nvPr>
+            <p:ph type="title"/>
+          </p:nvPr>
+        </p:nvSpPr>
+        <p:spPr>
+          <a:xfrm>
+            <a:off x="841247" y="978619"/>
+            <a:ext cx="3410712" cy="1106424"/>
+          </a:xfrm>
+        </p:spPr>
+        <p:txBody>
+          <a:bodyPr vert="horz" lIns="91440" tIns="45720" rIns="91440" bIns="45720" rtlCol="0" anchor="ctr">
+            <a:normAutofit/>
+          </a:bodyPr>
+          <a:lstStyle/>
+          <a:p>
+            <a:r>
+              <a:rPr lang="en-US" sz="2800" b="1" dirty="0"/>
+              <a:t>K-Means (III): </a:t>
+            </a:r>
+            <a:br>
+              <a:rPr lang="en-US" sz="2800" b="1" dirty="0"/>
+            </a:br>
+            <a:r>
+              <a:rPr lang="en-US" sz="2800" dirty="0" err="1"/>
+              <a:t>Barock</a:t>
+            </a:r>
+            <a:r>
+              <a:rPr lang="en-US" sz="2800" dirty="0"/>
+              <a:t>/</a:t>
+            </a:r>
+            <a:r>
+              <a:rPr lang="en-US" sz="2800" dirty="0" err="1"/>
+              <a:t>Realismus</a:t>
+            </a:r>
+            <a:endParaRPr lang="en-US" sz="2800" dirty="0"/>
+          </a:p>
+        </p:txBody>
+      </p:sp>
+      <p:sp>
+        <p:nvSpPr>
+          <p:cNvPr id="54" name="Rectangle 53">
+            <a:extLst>
+              <a:ext uri="{FF2B5EF4-FFF2-40B4-BE49-F238E27FC236}">
+                <a16:creationId xmlns:a16="http://schemas.microsoft.com/office/drawing/2014/main" id="{2711A8FB-68FC-45FC-B01E-38F809E2D439}"/>
+              </a:ext>
+              <a:ext uri="{C183D7F6-B498-43B3-948B-1728B52AA6E4}">
+                <adec:decorative xmlns:adec="http://schemas.microsoft.com/office/drawing/2017/decorative" val="1"/>
+              </a:ext>
+            </a:extLst>
+          </p:cNvPr>
+          <p:cNvSpPr>
+            <a:spLocks noGrp="1" noRot="1" noChangeAspect="1" noMove="1" noResize="1" noEditPoints="1" noAdjustHandles="1" noChangeArrowheads="1" noChangeShapeType="1" noTextEdit="1"/>
+          </p:cNvSpPr>
+          <p:nvPr>
+            <p:extLst>
+              <p:ext uri="{386F3935-93C4-4BCD-93E2-E3B085C9AB24}">
+                <p16:designElem xmlns:p16="http://schemas.microsoft.com/office/powerpoint/2015/main" val="1"/>
+              </p:ext>
+            </p:extLst>
+          </p:nvPr>
+        </p:nvSpPr>
+        <p:spPr>
+          <a:xfrm>
+            <a:off x="345567" y="1171300"/>
+            <a:ext cx="128016" cy="704088"/>
+          </a:xfrm>
+          <a:prstGeom prst="rect">
+            <a:avLst/>
+          </a:prstGeom>
+          <a:solidFill>
+            <a:schemeClr val="accent1"/>
+          </a:solidFill>
+          <a:ln>
+            <a:noFill/>
+          </a:ln>
+        </p:spPr>
+        <p:style>
+          <a:lnRef idx="2">
+            <a:schemeClr val="accent1">
+              <a:shade val="50000"/>
+            </a:schemeClr>
+          </a:lnRef>
+          <a:fillRef idx="1">
+            <a:schemeClr val="accent1"/>
+          </a:fillRef>
+          <a:effectRef idx="0">
+            <a:schemeClr val="accent1"/>
+          </a:effectRef>
+          <a:fontRef idx="minor">
+            <a:schemeClr val="lt1"/>
+          </a:fontRef>
+        </p:style>
+        <p:txBody>
+          <a:bodyPr rtlCol="0" anchor="ctr"/>
+          <a:lstStyle/>
+          <a:p>
+            <a:pPr marL="0" marR="0" lvl="0" indent="0" algn="ctr" defTabSz="914400" rtl="0" eaLnBrk="1" fontAlgn="auto" latinLnBrk="0" hangingPunct="1">
+              <a:lnSpc>
+                <a:spcPct val="100000"/>
+              </a:lnSpc>
+              <a:spcBef>
+                <a:spcPts val="0"/>
+              </a:spcBef>
+              <a:spcAft>
+                <a:spcPts val="0"/>
+              </a:spcAft>
+              <a:buClrTx/>
+              <a:buSzTx/>
+              <a:buFontTx/>
+              <a:buNone/>
+              <a:tabLst/>
+              <a:defRPr/>
+            </a:pPr>
+            <a:endParaRPr kumimoji="0" lang="en-US" sz="1800" b="0" i="0" u="none" strike="noStrike" kern="1200" cap="none" spc="0" normalizeH="0" baseline="0" noProof="0">
+              <a:ln>
+                <a:noFill/>
+              </a:ln>
+              <a:solidFill>
+                <a:prstClr val="white"/>
+              </a:solidFill>
+              <a:effectLst/>
+              <a:uLnTx/>
+              <a:uFillTx/>
+              <a:latin typeface="Calibri" panose="020F0502020204030204"/>
+              <a:ea typeface="+mn-ea"/>
+              <a:cs typeface="+mn-cs"/>
+            </a:endParaRPr>
+          </a:p>
+        </p:txBody>
+      </p:sp>
+      <p:sp>
+        <p:nvSpPr>
+          <p:cNvPr id="56" name="Rectangle 55">
+            <a:extLst>
+              <a:ext uri="{FF2B5EF4-FFF2-40B4-BE49-F238E27FC236}">
+                <a16:creationId xmlns:a16="http://schemas.microsoft.com/office/drawing/2014/main" id="{2A865FE3-5FC9-4049-87CF-30019C46C0F5}"/>
+              </a:ext>
+              <a:ext uri="{C183D7F6-B498-43B3-948B-1728B52AA6E4}">
+                <adec:decorative xmlns:adec="http://schemas.microsoft.com/office/drawing/2017/decorative" val="1"/>
+              </a:ext>
+            </a:extLst>
+          </p:cNvPr>
+          <p:cNvSpPr>
+            <a:spLocks noGrp="1" noRot="1" noChangeAspect="1" noMove="1" noResize="1" noEditPoints="1" noAdjustHandles="1" noChangeArrowheads="1" noChangeShapeType="1" noTextEdit="1"/>
+          </p:cNvSpPr>
+          <p:nvPr>
+            <p:extLst>
+              <p:ext uri="{386F3935-93C4-4BCD-93E2-E3B085C9AB24}">
+                <p16:designElem xmlns:p16="http://schemas.microsoft.com/office/powerpoint/2015/main" val="1"/>
+              </p:ext>
+            </p:extLst>
+          </p:nvPr>
+        </p:nvSpPr>
+        <p:spPr>
+          <a:xfrm>
+            <a:off x="877459" y="2093976"/>
+            <a:ext cx="3328416" cy="9144"/>
+          </a:xfrm>
+          <a:prstGeom prst="rect">
+            <a:avLst/>
+          </a:prstGeom>
+          <a:solidFill>
+            <a:schemeClr val="tx2">
+              <a:lumMod val="25000"/>
+              <a:lumOff val="75000"/>
+            </a:schemeClr>
+          </a:solidFill>
+          <a:ln w="3175">
+            <a:noFill/>
+          </a:ln>
+          <a:effectLst/>
+        </p:spPr>
+        <p:style>
+          <a:lnRef idx="2">
+            <a:schemeClr val="accent1">
+              <a:shade val="50000"/>
+            </a:schemeClr>
+          </a:lnRef>
+          <a:fillRef idx="1">
+            <a:schemeClr val="accent1"/>
+          </a:fillRef>
+          <a:effectRef idx="0">
+            <a:schemeClr val="accent1"/>
+          </a:effectRef>
+          <a:fontRef idx="minor">
+            <a:schemeClr val="lt1"/>
+          </a:fontRef>
+        </p:style>
+        <p:txBody>
+          <a:bodyPr rtlCol="0" anchor="ctr"/>
+          <a:lstStyle/>
+          <a:p>
+            <a:pPr marL="0" marR="0" lvl="0" indent="0" algn="ctr" defTabSz="914400" rtl="0" eaLnBrk="1" fontAlgn="auto" latinLnBrk="0" hangingPunct="1">
+              <a:lnSpc>
+                <a:spcPct val="100000"/>
+              </a:lnSpc>
+              <a:spcBef>
+                <a:spcPts val="0"/>
+              </a:spcBef>
+              <a:spcAft>
+                <a:spcPts val="0"/>
+              </a:spcAft>
+              <a:buClrTx/>
+              <a:buSzTx/>
+              <a:buFontTx/>
+              <a:buNone/>
+              <a:tabLst/>
+              <a:defRPr/>
+            </a:pPr>
+            <a:endParaRPr kumimoji="0" lang="en-US" sz="1800" b="0" i="0" u="none" strike="noStrike" kern="1200" cap="none" spc="0" normalizeH="0" baseline="0" noProof="0">
+              <a:ln>
+                <a:noFill/>
+              </a:ln>
+              <a:solidFill>
+                <a:prstClr val="white"/>
+              </a:solidFill>
+              <a:effectLst/>
+              <a:uLnTx/>
+              <a:uFillTx/>
+              <a:latin typeface="Calibri" panose="020F0502020204030204"/>
+              <a:ea typeface="+mn-ea"/>
+              <a:cs typeface="+mn-cs"/>
+            </a:endParaRPr>
+          </a:p>
+        </p:txBody>
+      </p:sp>
+      <p:sp>
+        <p:nvSpPr>
+          <p:cNvPr id="6" name="TextBox 5">
+            <a:extLst>
+              <a:ext uri="{FF2B5EF4-FFF2-40B4-BE49-F238E27FC236}">
+                <a16:creationId xmlns:a16="http://schemas.microsoft.com/office/drawing/2014/main" id="{90F669C5-0123-2348-A259-7BE0C33F2448}"/>
+              </a:ext>
+            </a:extLst>
+          </p:cNvPr>
+          <p:cNvSpPr txBox="1"/>
+          <p:nvPr/>
+        </p:nvSpPr>
+        <p:spPr>
+          <a:xfrm>
+            <a:off x="841247" y="2252870"/>
+            <a:ext cx="3412220" cy="2492867"/>
+          </a:xfrm>
+          <a:prstGeom prst="rect">
+            <a:avLst/>
+          </a:prstGeom>
+        </p:spPr>
+        <p:txBody>
+          <a:bodyPr vert="horz" lIns="91440" tIns="45720" rIns="91440" bIns="45720" rtlCol="0">
+            <a:normAutofit/>
+          </a:bodyPr>
+          <a:lstStyle/>
+          <a:p>
+            <a:pPr>
+              <a:lnSpc>
+                <a:spcPct val="110000"/>
+              </a:lnSpc>
+              <a:spcAft>
+                <a:spcPts val="600"/>
+              </a:spcAft>
+            </a:pPr>
+            <a:r>
+              <a:rPr lang="en-US" sz="2400" b="1" dirty="0"/>
+              <a:t>Cluster 0</a:t>
+            </a:r>
+            <a:r>
+              <a:rPr lang="en-US" sz="2400" dirty="0"/>
+              <a:t>: 1619-1697	      (1651-1697)</a:t>
+            </a:r>
+            <a:endParaRPr lang="en-US" sz="2400" b="1" dirty="0"/>
+          </a:p>
+          <a:p>
+            <a:pPr>
+              <a:lnSpc>
+                <a:spcPct val="110000"/>
+              </a:lnSpc>
+              <a:spcAft>
+                <a:spcPts val="600"/>
+              </a:spcAft>
+            </a:pPr>
+            <a:r>
+              <a:rPr lang="en-US" sz="2400" b="1" dirty="0"/>
+              <a:t>Cluster 1</a:t>
+            </a:r>
+            <a:r>
+              <a:rPr lang="en-US" sz="2400" dirty="0"/>
+              <a:t>: 1650-1899</a:t>
+            </a:r>
+          </a:p>
+          <a:p>
+            <a:pPr>
+              <a:lnSpc>
+                <a:spcPct val="110000"/>
+              </a:lnSpc>
+              <a:spcAft>
+                <a:spcPts val="600"/>
+              </a:spcAft>
+            </a:pPr>
+            <a:r>
+              <a:rPr lang="en-US" sz="2400" b="1" dirty="0"/>
+              <a:t> 	      </a:t>
+            </a:r>
+            <a:r>
+              <a:rPr lang="en-US" sz="2400" dirty="0"/>
+              <a:t>(1849-1899)</a:t>
+            </a:r>
+          </a:p>
+          <a:p>
+            <a:pPr>
+              <a:lnSpc>
+                <a:spcPct val="110000"/>
+              </a:lnSpc>
+              <a:spcAft>
+                <a:spcPts val="600"/>
+              </a:spcAft>
+            </a:pPr>
+            <a:r>
+              <a:rPr lang="en-US" sz="2400" b="1" dirty="0"/>
+              <a:t>Cluster 2</a:t>
+            </a:r>
+            <a:r>
+              <a:rPr lang="en-US" sz="2400" dirty="0"/>
+              <a:t>: 1613-1655</a:t>
+            </a:r>
+          </a:p>
+        </p:txBody>
+      </p:sp>
+      <p:pic>
+        <p:nvPicPr>
+          <p:cNvPr id="7" name="Picture 6" descr="A screenshot of a cell phone&#10;&#10;Description automatically generated">
+            <a:extLst>
+              <a:ext uri="{FF2B5EF4-FFF2-40B4-BE49-F238E27FC236}">
+                <a16:creationId xmlns:a16="http://schemas.microsoft.com/office/drawing/2014/main" id="{EC086924-224E-974E-8DBB-CE206BE5D131}"/>
+              </a:ext>
+            </a:extLst>
+          </p:cNvPr>
+          <p:cNvPicPr>
+            <a:picLocks noChangeAspect="1"/>
+          </p:cNvPicPr>
+          <p:nvPr/>
+        </p:nvPicPr>
+        <p:blipFill rotWithShape="1">
+          <a:blip r:embed="rId3"/>
+          <a:srcRect l="10590" t="5472" r="16840" b="10324"/>
+          <a:stretch/>
+        </p:blipFill>
+        <p:spPr>
+          <a:xfrm>
+            <a:off x="4673759" y="461825"/>
+            <a:ext cx="7439034" cy="5934350"/>
+          </a:xfrm>
+          <a:prstGeom prst="rect">
+            <a:avLst/>
+          </a:prstGeom>
+        </p:spPr>
+      </p:pic>
+    </p:spTree>
+    <p:extLst>
+      <p:ext uri="{BB962C8B-B14F-4D97-AF65-F5344CB8AC3E}">
+        <p14:creationId xmlns:p14="http://schemas.microsoft.com/office/powerpoint/2010/main" val="2409353517"/>
+      </p:ext>
+    </p:extLst>
+  </p:cSld>
+  <p:clrMapOvr>
+    <a:masterClrMapping/>
+  </p:clrMapOvr>
+</p:sld>
+</file>
+
+<file path=ppt/slides/slide28.xml><?xml version="1.0" encoding="utf-8"?>
+<p:sld xmlns:a="http://schemas.openxmlformats.org/drawingml/2006/main" xmlns:r="http://schemas.openxmlformats.org/officeDocument/2006/relationships" xmlns:p="http://schemas.openxmlformats.org/presentationml/2006/main">
+  <p:cSld>
+    <p:bg>
+      <p:bgPr>
+        <a:solidFill>
+          <a:schemeClr val="bg1"/>
+        </a:solidFill>
+        <a:effectLst/>
+      </p:bgPr>
+    </p:bg>
+    <p:spTree>
+      <p:nvGrpSpPr>
+        <p:cNvPr id="1" name=""/>
+        <p:cNvGrpSpPr/>
+        <p:nvPr/>
+      </p:nvGrpSpPr>
+      <p:grpSpPr>
+        <a:xfrm>
+          <a:off x="0" y="0"/>
+          <a:ext cx="0" cy="0"/>
+          <a:chOff x="0" y="0"/>
+          <a:chExt cx="0" cy="0"/>
+        </a:xfrm>
+      </p:grpSpPr>
+      <p:sp useBgFill="1">
+        <p:nvSpPr>
+          <p:cNvPr id="50" name="Rectangle 49">
+            <a:extLst>
+              <a:ext uri="{FF2B5EF4-FFF2-40B4-BE49-F238E27FC236}">
+                <a16:creationId xmlns:a16="http://schemas.microsoft.com/office/drawing/2014/main" id="{2C9A9DA9-7DC8-488B-A882-123947B0F3D9}"/>
+              </a:ext>
+              <a:ext uri="{C183D7F6-B498-43B3-948B-1728B52AA6E4}">
+                <adec:decorative xmlns:adec="http://schemas.microsoft.com/office/drawing/2017/decorative" val="1"/>
+              </a:ext>
+            </a:extLst>
+          </p:cNvPr>
+          <p:cNvSpPr>
+            <a:spLocks noGrp="1" noRot="1" noChangeAspect="1" noMove="1" noResize="1" noEditPoints="1" noAdjustHandles="1" noChangeArrowheads="1" noChangeShapeType="1" noTextEdit="1"/>
+          </p:cNvSpPr>
+          <p:nvPr>
+            <p:extLst>
+              <p:ext uri="{386F3935-93C4-4BCD-93E2-E3B085C9AB24}">
+                <p16:designElem xmlns:p16="http://schemas.microsoft.com/office/powerpoint/2015/main" val="1"/>
+              </p:ext>
+            </p:extLst>
+          </p:nvPr>
+        </p:nvSpPr>
+        <p:spPr>
+          <a:xfrm>
+            <a:off x="0" y="0"/>
+            <a:ext cx="12192000" cy="6858000"/>
+          </a:xfrm>
+          <a:prstGeom prst="rect">
+            <a:avLst/>
+          </a:prstGeom>
+          <a:ln>
+            <a:noFill/>
+          </a:ln>
+        </p:spPr>
+        <p:style>
+          <a:lnRef idx="2">
+            <a:schemeClr val="accent1">
+              <a:shade val="50000"/>
+            </a:schemeClr>
+          </a:lnRef>
+          <a:fillRef idx="1">
+            <a:schemeClr val="accent1"/>
+          </a:fillRef>
+          <a:effectRef idx="0">
+            <a:schemeClr val="accent1"/>
+          </a:effectRef>
+          <a:fontRef idx="minor">
+            <a:schemeClr val="lt1"/>
+          </a:fontRef>
+        </p:style>
+        <p:txBody>
+          <a:bodyPr rtlCol="0" anchor="ctr"/>
+          <a:lstStyle/>
+          <a:p>
+            <a:pPr algn="ctr"/>
+            <a:endParaRPr lang="en-US"/>
+          </a:p>
+        </p:txBody>
+      </p:sp>
+      <p:sp useBgFill="1">
+        <p:nvSpPr>
+          <p:cNvPr id="52" name="Rectangle 51">
+            <a:extLst>
+              <a:ext uri="{FF2B5EF4-FFF2-40B4-BE49-F238E27FC236}">
+                <a16:creationId xmlns:a16="http://schemas.microsoft.com/office/drawing/2014/main" id="{57F6BDD4-E066-4008-8011-6CC31AEB4556}"/>
+              </a:ext>
+              <a:ext uri="{C183D7F6-B498-43B3-948B-1728B52AA6E4}">
+                <adec:decorative xmlns:adec="http://schemas.microsoft.com/office/drawing/2017/decorative" val="1"/>
+              </a:ext>
+            </a:extLst>
+          </p:cNvPr>
+          <p:cNvSpPr>
+            <a:spLocks noGrp="1" noRot="1" noChangeAspect="1" noMove="1" noResize="1" noEditPoints="1" noAdjustHandles="1" noChangeArrowheads="1" noChangeShapeType="1" noTextEdit="1"/>
+          </p:cNvSpPr>
+          <p:nvPr>
+            <p:extLst>
+              <p:ext uri="{386F3935-93C4-4BCD-93E2-E3B085C9AB24}">
+                <p16:designElem xmlns:p16="http://schemas.microsoft.com/office/powerpoint/2015/main" val="1"/>
+              </p:ext>
+            </p:extLst>
+          </p:nvPr>
+        </p:nvSpPr>
+        <p:spPr>
+          <a:xfrm>
+            <a:off x="409575" y="633619"/>
+            <a:ext cx="4279383" cy="5495925"/>
+          </a:xfrm>
+          <a:prstGeom prst="rect">
+            <a:avLst/>
+          </a:prstGeom>
+          <a:ln w="9525">
+            <a:solidFill>
+              <a:schemeClr val="tx2">
+                <a:lumMod val="10000"/>
+                <a:lumOff val="90000"/>
+              </a:schemeClr>
+            </a:solidFill>
+          </a:ln>
+          <a:effectLst>
+            <a:outerShdw blurRad="50800" dist="38100" dir="2700000" algn="tl" rotWithShape="0">
+              <a:schemeClr val="bg1">
+                <a:lumMod val="85000"/>
+                <a:alpha val="30000"/>
+              </a:schemeClr>
+            </a:outerShdw>
+          </a:effectLst>
+        </p:spPr>
+        <p:style>
+          <a:lnRef idx="2">
+            <a:schemeClr val="accent1">
+              <a:shade val="50000"/>
+            </a:schemeClr>
+          </a:lnRef>
+          <a:fillRef idx="1">
+            <a:schemeClr val="accent1"/>
+          </a:fillRef>
+          <a:effectRef idx="0">
+            <a:schemeClr val="accent1"/>
+          </a:effectRef>
+          <a:fontRef idx="minor">
+            <a:schemeClr val="lt1"/>
+          </a:fontRef>
+        </p:style>
+        <p:txBody>
+          <a:bodyPr rtlCol="0" anchor="ctr"/>
+          <a:lstStyle/>
+          <a:p>
+            <a:pPr marL="0" marR="0" lvl="0" indent="0" algn="ctr" defTabSz="914400" rtl="0" eaLnBrk="1" fontAlgn="auto" latinLnBrk="0" hangingPunct="1">
+              <a:lnSpc>
+                <a:spcPct val="100000"/>
+              </a:lnSpc>
+              <a:spcBef>
+                <a:spcPts val="0"/>
+              </a:spcBef>
+              <a:spcAft>
+                <a:spcPts val="0"/>
+              </a:spcAft>
+              <a:buClrTx/>
+              <a:buSzTx/>
+              <a:buFontTx/>
+              <a:buNone/>
+              <a:tabLst/>
+              <a:defRPr/>
+            </a:pPr>
+            <a:endParaRPr kumimoji="0" lang="en-US" sz="1800" b="0" i="0" u="none" strike="noStrike" kern="1200" cap="none" spc="0" normalizeH="0" baseline="0" noProof="0">
+              <a:ln>
+                <a:noFill/>
+              </a:ln>
+              <a:solidFill>
+                <a:prstClr val="white"/>
+              </a:solidFill>
+              <a:effectLst/>
+              <a:uLnTx/>
+              <a:uFillTx/>
+              <a:latin typeface="Calibri" panose="020F0502020204030204"/>
+              <a:ea typeface="+mn-ea"/>
+              <a:cs typeface="+mn-cs"/>
+            </a:endParaRPr>
+          </a:p>
+        </p:txBody>
+      </p:sp>
+      <p:sp>
+        <p:nvSpPr>
+          <p:cNvPr id="2" name="Title 1">
+            <a:extLst>
+              <a:ext uri="{FF2B5EF4-FFF2-40B4-BE49-F238E27FC236}">
+                <a16:creationId xmlns:a16="http://schemas.microsoft.com/office/drawing/2014/main" id="{54ADA480-6AB0-844F-9E88-B8120036CC75}"/>
+              </a:ext>
+            </a:extLst>
+          </p:cNvPr>
+          <p:cNvSpPr>
+            <a:spLocks noGrp="1"/>
+          </p:cNvSpPr>
+          <p:nvPr>
+            <p:ph type="title"/>
+          </p:nvPr>
+        </p:nvSpPr>
+        <p:spPr>
+          <a:xfrm>
+            <a:off x="841247" y="978619"/>
+            <a:ext cx="3410712" cy="1106424"/>
+          </a:xfrm>
+        </p:spPr>
+        <p:txBody>
+          <a:bodyPr vert="horz" lIns="91440" tIns="45720" rIns="91440" bIns="45720" rtlCol="0" anchor="ctr">
+            <a:normAutofit/>
+          </a:bodyPr>
+          <a:lstStyle/>
+          <a:p>
+            <a:r>
+              <a:rPr lang="en-US" sz="2800" b="1" dirty="0"/>
+              <a:t>K-Means (III): </a:t>
+            </a:r>
+            <a:br>
+              <a:rPr lang="en-US" sz="2800" b="1" dirty="0"/>
+            </a:br>
+            <a:r>
+              <a:rPr lang="en-US" sz="2800" dirty="0" err="1"/>
+              <a:t>Barock</a:t>
+            </a:r>
+            <a:r>
+              <a:rPr lang="en-US" sz="2800" dirty="0"/>
+              <a:t>/</a:t>
+            </a:r>
+            <a:r>
+              <a:rPr lang="en-US" sz="2800" dirty="0" err="1"/>
+              <a:t>Realismus</a:t>
+            </a:r>
+            <a:endParaRPr lang="en-US" sz="2800" dirty="0"/>
+          </a:p>
+        </p:txBody>
+      </p:sp>
+      <p:sp>
+        <p:nvSpPr>
+          <p:cNvPr id="54" name="Rectangle 53">
+            <a:extLst>
+              <a:ext uri="{FF2B5EF4-FFF2-40B4-BE49-F238E27FC236}">
+                <a16:creationId xmlns:a16="http://schemas.microsoft.com/office/drawing/2014/main" id="{2711A8FB-68FC-45FC-B01E-38F809E2D439}"/>
+              </a:ext>
+              <a:ext uri="{C183D7F6-B498-43B3-948B-1728B52AA6E4}">
+                <adec:decorative xmlns:adec="http://schemas.microsoft.com/office/drawing/2017/decorative" val="1"/>
+              </a:ext>
+            </a:extLst>
+          </p:cNvPr>
+          <p:cNvSpPr>
+            <a:spLocks noGrp="1" noRot="1" noChangeAspect="1" noMove="1" noResize="1" noEditPoints="1" noAdjustHandles="1" noChangeArrowheads="1" noChangeShapeType="1" noTextEdit="1"/>
+          </p:cNvSpPr>
+          <p:nvPr>
+            <p:extLst>
+              <p:ext uri="{386F3935-93C4-4BCD-93E2-E3B085C9AB24}">
+                <p16:designElem xmlns:p16="http://schemas.microsoft.com/office/powerpoint/2015/main" val="1"/>
+              </p:ext>
+            </p:extLst>
+          </p:nvPr>
+        </p:nvSpPr>
+        <p:spPr>
+          <a:xfrm>
+            <a:off x="345567" y="1171300"/>
+            <a:ext cx="128016" cy="704088"/>
+          </a:xfrm>
+          <a:prstGeom prst="rect">
+            <a:avLst/>
+          </a:prstGeom>
+          <a:solidFill>
+            <a:schemeClr val="accent1"/>
+          </a:solidFill>
+          <a:ln>
+            <a:noFill/>
+          </a:ln>
+        </p:spPr>
+        <p:style>
+          <a:lnRef idx="2">
+            <a:schemeClr val="accent1">
+              <a:shade val="50000"/>
+            </a:schemeClr>
+          </a:lnRef>
+          <a:fillRef idx="1">
+            <a:schemeClr val="accent1"/>
+          </a:fillRef>
+          <a:effectRef idx="0">
+            <a:schemeClr val="accent1"/>
+          </a:effectRef>
+          <a:fontRef idx="minor">
+            <a:schemeClr val="lt1"/>
+          </a:fontRef>
+        </p:style>
+        <p:txBody>
+          <a:bodyPr rtlCol="0" anchor="ctr"/>
+          <a:lstStyle/>
+          <a:p>
+            <a:pPr marL="0" marR="0" lvl="0" indent="0" algn="ctr" defTabSz="914400" rtl="0" eaLnBrk="1" fontAlgn="auto" latinLnBrk="0" hangingPunct="1">
+              <a:lnSpc>
+                <a:spcPct val="100000"/>
+              </a:lnSpc>
+              <a:spcBef>
+                <a:spcPts val="0"/>
+              </a:spcBef>
+              <a:spcAft>
+                <a:spcPts val="0"/>
+              </a:spcAft>
+              <a:buClrTx/>
+              <a:buSzTx/>
+              <a:buFontTx/>
+              <a:buNone/>
+              <a:tabLst/>
+              <a:defRPr/>
+            </a:pPr>
+            <a:endParaRPr kumimoji="0" lang="en-US" sz="1800" b="0" i="0" u="none" strike="noStrike" kern="1200" cap="none" spc="0" normalizeH="0" baseline="0" noProof="0">
+              <a:ln>
+                <a:noFill/>
+              </a:ln>
+              <a:solidFill>
+                <a:prstClr val="white"/>
+              </a:solidFill>
+              <a:effectLst/>
+              <a:uLnTx/>
+              <a:uFillTx/>
+              <a:latin typeface="Calibri" panose="020F0502020204030204"/>
+              <a:ea typeface="+mn-ea"/>
+              <a:cs typeface="+mn-cs"/>
+            </a:endParaRPr>
+          </a:p>
+        </p:txBody>
+      </p:sp>
+      <p:sp>
+        <p:nvSpPr>
+          <p:cNvPr id="56" name="Rectangle 55">
+            <a:extLst>
+              <a:ext uri="{FF2B5EF4-FFF2-40B4-BE49-F238E27FC236}">
+                <a16:creationId xmlns:a16="http://schemas.microsoft.com/office/drawing/2014/main" id="{2A865FE3-5FC9-4049-87CF-30019C46C0F5}"/>
+              </a:ext>
+              <a:ext uri="{C183D7F6-B498-43B3-948B-1728B52AA6E4}">
+                <adec:decorative xmlns:adec="http://schemas.microsoft.com/office/drawing/2017/decorative" val="1"/>
+              </a:ext>
+            </a:extLst>
+          </p:cNvPr>
+          <p:cNvSpPr>
+            <a:spLocks noGrp="1" noRot="1" noChangeAspect="1" noMove="1" noResize="1" noEditPoints="1" noAdjustHandles="1" noChangeArrowheads="1" noChangeShapeType="1" noTextEdit="1"/>
+          </p:cNvSpPr>
+          <p:nvPr>
+            <p:extLst>
+              <p:ext uri="{386F3935-93C4-4BCD-93E2-E3B085C9AB24}">
+                <p16:designElem xmlns:p16="http://schemas.microsoft.com/office/powerpoint/2015/main" val="1"/>
+              </p:ext>
+            </p:extLst>
+          </p:nvPr>
+        </p:nvSpPr>
+        <p:spPr>
+          <a:xfrm>
+            <a:off x="877459" y="2093976"/>
+            <a:ext cx="3328416" cy="9144"/>
+          </a:xfrm>
+          <a:prstGeom prst="rect">
+            <a:avLst/>
+          </a:prstGeom>
+          <a:solidFill>
+            <a:schemeClr val="tx2">
+              <a:lumMod val="25000"/>
+              <a:lumOff val="75000"/>
+            </a:schemeClr>
+          </a:solidFill>
+          <a:ln w="3175">
+            <a:noFill/>
+          </a:ln>
+          <a:effectLst/>
+        </p:spPr>
+        <p:style>
+          <a:lnRef idx="2">
+            <a:schemeClr val="accent1">
+              <a:shade val="50000"/>
+            </a:schemeClr>
+          </a:lnRef>
+          <a:fillRef idx="1">
+            <a:schemeClr val="accent1"/>
+          </a:fillRef>
+          <a:effectRef idx="0">
+            <a:schemeClr val="accent1"/>
+          </a:effectRef>
+          <a:fontRef idx="minor">
+            <a:schemeClr val="lt1"/>
+          </a:fontRef>
+        </p:style>
+        <p:txBody>
+          <a:bodyPr rtlCol="0" anchor="ctr"/>
+          <a:lstStyle/>
+          <a:p>
+            <a:pPr marL="0" marR="0" lvl="0" indent="0" algn="ctr" defTabSz="914400" rtl="0" eaLnBrk="1" fontAlgn="auto" latinLnBrk="0" hangingPunct="1">
+              <a:lnSpc>
+                <a:spcPct val="100000"/>
+              </a:lnSpc>
+              <a:spcBef>
+                <a:spcPts val="0"/>
+              </a:spcBef>
+              <a:spcAft>
+                <a:spcPts val="0"/>
+              </a:spcAft>
+              <a:buClrTx/>
+              <a:buSzTx/>
+              <a:buFontTx/>
+              <a:buNone/>
+              <a:tabLst/>
+              <a:defRPr/>
+            </a:pPr>
+            <a:endParaRPr kumimoji="0" lang="en-US" sz="1800" b="0" i="0" u="none" strike="noStrike" kern="1200" cap="none" spc="0" normalizeH="0" baseline="0" noProof="0">
+              <a:ln>
+                <a:noFill/>
+              </a:ln>
+              <a:solidFill>
+                <a:prstClr val="white"/>
+              </a:solidFill>
+              <a:effectLst/>
+              <a:uLnTx/>
+              <a:uFillTx/>
+              <a:latin typeface="Calibri" panose="020F0502020204030204"/>
+              <a:ea typeface="+mn-ea"/>
+              <a:cs typeface="+mn-cs"/>
+            </a:endParaRPr>
+          </a:p>
+        </p:txBody>
+      </p:sp>
+      <p:sp>
+        <p:nvSpPr>
+          <p:cNvPr id="6" name="TextBox 5">
+            <a:extLst>
+              <a:ext uri="{FF2B5EF4-FFF2-40B4-BE49-F238E27FC236}">
+                <a16:creationId xmlns:a16="http://schemas.microsoft.com/office/drawing/2014/main" id="{90F669C5-0123-2348-A259-7BE0C33F2448}"/>
+              </a:ext>
+            </a:extLst>
+          </p:cNvPr>
+          <p:cNvSpPr txBox="1"/>
+          <p:nvPr/>
+        </p:nvSpPr>
+        <p:spPr>
+          <a:xfrm>
+            <a:off x="473583" y="2263628"/>
+            <a:ext cx="4279383" cy="2492867"/>
+          </a:xfrm>
+          <a:prstGeom prst="rect">
+            <a:avLst/>
+          </a:prstGeom>
+        </p:spPr>
+        <p:txBody>
+          <a:bodyPr vert="horz" lIns="91440" tIns="45720" rIns="91440" bIns="45720" rtlCol="0">
+            <a:normAutofit/>
+          </a:bodyPr>
+          <a:lstStyle/>
+          <a:p>
+            <a:pPr>
+              <a:lnSpc>
+                <a:spcPct val="110000"/>
+              </a:lnSpc>
+              <a:spcAft>
+                <a:spcPts val="600"/>
+              </a:spcAft>
+            </a:pPr>
+            <a:r>
+              <a:rPr lang="en-US" sz="2400" b="1" dirty="0"/>
+              <a:t>0 - </a:t>
+            </a:r>
+            <a:r>
+              <a:rPr lang="en-US" sz="2400" b="1" dirty="0" err="1"/>
+              <a:t>Hochbarock</a:t>
+            </a:r>
+            <a:r>
+              <a:rPr lang="en-US" sz="2400" dirty="0"/>
+              <a:t>: 1651-1697</a:t>
+            </a:r>
+            <a:endParaRPr lang="en-US" sz="2400" b="1" dirty="0"/>
+          </a:p>
+          <a:p>
+            <a:pPr>
+              <a:lnSpc>
+                <a:spcPct val="110000"/>
+              </a:lnSpc>
+              <a:spcAft>
+                <a:spcPts val="600"/>
+              </a:spcAft>
+            </a:pPr>
+            <a:r>
+              <a:rPr lang="en-US" sz="2400" b="1" dirty="0"/>
+              <a:t>1 - </a:t>
+            </a:r>
+            <a:r>
+              <a:rPr lang="en-US" sz="2400" b="1" dirty="0" err="1"/>
+              <a:t>Realismus</a:t>
+            </a:r>
+            <a:r>
+              <a:rPr lang="en-US" sz="2400" dirty="0"/>
+              <a:t>:     1849-1899</a:t>
+            </a:r>
+          </a:p>
+          <a:p>
+            <a:pPr>
+              <a:lnSpc>
+                <a:spcPct val="110000"/>
+              </a:lnSpc>
+              <a:spcAft>
+                <a:spcPts val="600"/>
+              </a:spcAft>
+            </a:pPr>
+            <a:r>
+              <a:rPr lang="en-US" sz="2400" b="1" dirty="0"/>
+              <a:t>2 - </a:t>
+            </a:r>
+            <a:r>
+              <a:rPr lang="en-US" sz="2400" b="1" dirty="0" err="1"/>
+              <a:t>Frühbarock</a:t>
+            </a:r>
+            <a:r>
+              <a:rPr lang="en-US" sz="2400" dirty="0"/>
+              <a:t>:   1613-1655</a:t>
+            </a:r>
+          </a:p>
+        </p:txBody>
+      </p:sp>
+      <p:pic>
+        <p:nvPicPr>
+          <p:cNvPr id="9" name="Picture 8" descr="A screenshot of a cell phone&#10;&#10;Description automatically generated">
+            <a:extLst>
+              <a:ext uri="{FF2B5EF4-FFF2-40B4-BE49-F238E27FC236}">
+                <a16:creationId xmlns:a16="http://schemas.microsoft.com/office/drawing/2014/main" id="{3237CAFE-0E24-3042-9679-8D0B9A23F59A}"/>
+              </a:ext>
+            </a:extLst>
+          </p:cNvPr>
+          <p:cNvPicPr>
+            <a:picLocks noChangeAspect="1"/>
+          </p:cNvPicPr>
+          <p:nvPr/>
+        </p:nvPicPr>
+        <p:blipFill rotWithShape="1">
+          <a:blip r:embed="rId3"/>
+          <a:srcRect l="10590" t="5472" r="16840" b="10324"/>
+          <a:stretch/>
+        </p:blipFill>
+        <p:spPr>
+          <a:xfrm>
+            <a:off x="4688958" y="461825"/>
+            <a:ext cx="7439034" cy="5934350"/>
+          </a:xfrm>
+          <a:prstGeom prst="rect">
+            <a:avLst/>
+          </a:prstGeom>
+        </p:spPr>
+      </p:pic>
+    </p:spTree>
+    <p:extLst>
+      <p:ext uri="{BB962C8B-B14F-4D97-AF65-F5344CB8AC3E}">
+        <p14:creationId xmlns:p14="http://schemas.microsoft.com/office/powerpoint/2010/main" val="1664955814"/>
+      </p:ext>
+    </p:extLst>
+  </p:cSld>
+  <p:clrMapOvr>
+    <a:masterClrMapping/>
+  </p:clrMapOvr>
+</p:sld>
+</file>
+
+<file path=ppt/slides/slide29.xml><?xml version="1.0" encoding="utf-8"?>
+<p:sld xmlns:a="http://schemas.openxmlformats.org/drawingml/2006/main" xmlns:r="http://schemas.openxmlformats.org/officeDocument/2006/relationships" xmlns:p="http://schemas.openxmlformats.org/presentationml/2006/main">
+  <p:cSld>
+    <p:bg>
+      <p:bgPr>
+        <a:solidFill>
+          <a:schemeClr val="bg1"/>
+        </a:solidFill>
+        <a:effectLst/>
+      </p:bgPr>
+    </p:bg>
+    <p:spTree>
+      <p:nvGrpSpPr>
+        <p:cNvPr id="1" name=""/>
+        <p:cNvGrpSpPr/>
+        <p:nvPr/>
+      </p:nvGrpSpPr>
+      <p:grpSpPr>
+        <a:xfrm>
+          <a:off x="0" y="0"/>
+          <a:ext cx="0" cy="0"/>
+          <a:chOff x="0" y="0"/>
+          <a:chExt cx="0" cy="0"/>
+        </a:xfrm>
+      </p:grpSpPr>
+      <p:sp>
+        <p:nvSpPr>
+          <p:cNvPr id="41" name="Rectangle 26">
+            <a:extLst>
+              <a:ext uri="{FF2B5EF4-FFF2-40B4-BE49-F238E27FC236}">
+                <a16:creationId xmlns:a16="http://schemas.microsoft.com/office/drawing/2014/main" id="{8D06CE56-3881-4ADA-8CEF-D18B02C242A3}"/>
+              </a:ext>
+              <a:ext uri="{C183D7F6-B498-43B3-948B-1728B52AA6E4}">
+                <adec:decorative xmlns:adec="http://schemas.microsoft.com/office/drawing/2017/decorative" val="1"/>
+              </a:ext>
+            </a:extLst>
+          </p:cNvPr>
+          <p:cNvSpPr>
+            <a:spLocks noGrp="1" noRot="1" noChangeAspect="1" noMove="1" noResize="1" noEditPoints="1" noAdjustHandles="1" noChangeArrowheads="1" noChangeShapeType="1" noTextEdit="1"/>
+          </p:cNvSpPr>
+          <p:nvPr>
+            <p:extLst>
+              <p:ext uri="{386F3935-93C4-4BCD-93E2-E3B085C9AB24}">
+                <p16:designElem xmlns:p16="http://schemas.microsoft.com/office/powerpoint/2015/main" val="1"/>
+              </p:ext>
+            </p:extLst>
+          </p:nvPr>
+        </p:nvSpPr>
+        <p:spPr>
+          <a:xfrm rot="5400000">
+            <a:off x="857544" y="346791"/>
+            <a:ext cx="146304" cy="704088"/>
+          </a:xfrm>
+          <a:prstGeom prst="rect">
+            <a:avLst/>
+          </a:prstGeom>
+          <a:solidFill>
+            <a:schemeClr val="accent1"/>
+          </a:solidFill>
+          <a:ln>
+            <a:noFill/>
+          </a:ln>
+        </p:spPr>
+        <p:style>
+          <a:lnRef idx="2">
+            <a:schemeClr val="accent1">
+              <a:shade val="50000"/>
+            </a:schemeClr>
+          </a:lnRef>
+          <a:fillRef idx="1">
+            <a:schemeClr val="accent1"/>
+          </a:fillRef>
+          <a:effectRef idx="0">
+            <a:schemeClr val="accent1"/>
+          </a:effectRef>
+          <a:fontRef idx="minor">
+            <a:schemeClr val="lt1"/>
+          </a:fontRef>
+        </p:style>
+        <p:txBody>
+          <a:bodyPr rtlCol="0" anchor="ctr"/>
+          <a:lstStyle/>
+          <a:p>
+            <a:pPr marL="0" marR="0" lvl="0" indent="0" algn="ctr" defTabSz="914400" rtl="0" eaLnBrk="1" fontAlgn="auto" latinLnBrk="0" hangingPunct="1">
+              <a:lnSpc>
+                <a:spcPct val="100000"/>
+              </a:lnSpc>
+              <a:spcBef>
+                <a:spcPts val="0"/>
+              </a:spcBef>
+              <a:spcAft>
+                <a:spcPts val="0"/>
+              </a:spcAft>
+              <a:buClrTx/>
+              <a:buSzTx/>
+              <a:buFontTx/>
+              <a:buNone/>
+              <a:tabLst/>
+              <a:defRPr/>
+            </a:pPr>
+            <a:endParaRPr kumimoji="0" lang="en-US" sz="1800" b="0" i="0" u="none" strike="noStrike" kern="1200" cap="none" spc="0" normalizeH="0" baseline="0" noProof="0">
+              <a:ln>
+                <a:noFill/>
+              </a:ln>
+              <a:solidFill>
+                <a:prstClr val="white"/>
+              </a:solidFill>
+              <a:effectLst/>
+              <a:uLnTx/>
+              <a:uFillTx/>
+              <a:latin typeface="Calibri" panose="020F0502020204030204"/>
+              <a:ea typeface="+mn-ea"/>
+              <a:cs typeface="+mn-cs"/>
+            </a:endParaRPr>
+          </a:p>
+        </p:txBody>
+      </p:sp>
+      <p:sp>
+        <p:nvSpPr>
+          <p:cNvPr id="42" name="Rectangle 28">
+            <a:extLst>
+              <a:ext uri="{FF2B5EF4-FFF2-40B4-BE49-F238E27FC236}">
+                <a16:creationId xmlns:a16="http://schemas.microsoft.com/office/drawing/2014/main" id="{79F3C543-62EC-4433-9C93-A2CD8764E9B4}"/>
+              </a:ext>
+              <a:ext uri="{C183D7F6-B498-43B3-948B-1728B52AA6E4}">
+                <adec:decorative xmlns:adec="http://schemas.microsoft.com/office/drawing/2017/decorative" val="1"/>
+              </a:ext>
+            </a:extLst>
+          </p:cNvPr>
+          <p:cNvSpPr>
+            <a:spLocks noGrp="1" noRot="1" noChangeAspect="1" noMove="1" noResize="1" noEditPoints="1" noAdjustHandles="1" noChangeArrowheads="1" noChangeShapeType="1" noTextEdit="1"/>
+          </p:cNvSpPr>
+          <p:nvPr>
+            <p:extLst>
+              <p:ext uri="{386F3935-93C4-4BCD-93E2-E3B085C9AB24}">
+                <p16:designElem xmlns:p16="http://schemas.microsoft.com/office/powerpoint/2015/main" val="1"/>
+              </p:ext>
+            </p:extLst>
+          </p:nvPr>
+        </p:nvSpPr>
+        <p:spPr>
+          <a:xfrm flipV="1">
+            <a:off x="578652" y="4501201"/>
+            <a:ext cx="11034696" cy="18288"/>
+          </a:xfrm>
+          <a:prstGeom prst="rect">
+            <a:avLst/>
+          </a:prstGeom>
+          <a:solidFill>
+            <a:schemeClr val="tx2">
+              <a:lumMod val="25000"/>
+              <a:lumOff val="75000"/>
+            </a:schemeClr>
+          </a:solidFill>
+          <a:ln w="3175">
+            <a:noFill/>
+          </a:ln>
+          <a:effectLst/>
+        </p:spPr>
+        <p:style>
+          <a:lnRef idx="2">
+            <a:schemeClr val="accent1">
+              <a:shade val="50000"/>
+            </a:schemeClr>
+          </a:lnRef>
+          <a:fillRef idx="1">
+            <a:schemeClr val="accent1"/>
+          </a:fillRef>
+          <a:effectRef idx="0">
+            <a:schemeClr val="accent1"/>
+          </a:effectRef>
+          <a:fontRef idx="minor">
+            <a:schemeClr val="lt1"/>
+          </a:fontRef>
+        </p:style>
+        <p:txBody>
+          <a:bodyPr rtlCol="0" anchor="ctr"/>
+          <a:lstStyle/>
+          <a:p>
+            <a:pPr marL="0" marR="0" lvl="0" indent="0" algn="ctr" defTabSz="914400" rtl="0" eaLnBrk="1" fontAlgn="auto" latinLnBrk="0" hangingPunct="1">
+              <a:lnSpc>
+                <a:spcPct val="100000"/>
+              </a:lnSpc>
+              <a:spcBef>
+                <a:spcPts val="0"/>
+              </a:spcBef>
+              <a:spcAft>
+                <a:spcPts val="0"/>
+              </a:spcAft>
+              <a:buClrTx/>
+              <a:buSzTx/>
+              <a:buFontTx/>
+              <a:buNone/>
+              <a:tabLst/>
+              <a:defRPr/>
+            </a:pPr>
+            <a:endParaRPr kumimoji="0" lang="en-US" sz="1800" b="0" i="0" u="none" strike="noStrike" kern="1200" cap="none" spc="0" normalizeH="0" baseline="0" noProof="0">
+              <a:ln>
+                <a:noFill/>
+              </a:ln>
+              <a:solidFill>
+                <a:prstClr val="white"/>
+              </a:solidFill>
+              <a:effectLst/>
+              <a:uLnTx/>
+              <a:uFillTx/>
+              <a:latin typeface="Calibri" panose="020F0502020204030204"/>
+              <a:ea typeface="+mn-ea"/>
+              <a:cs typeface="+mn-cs"/>
+            </a:endParaRPr>
+          </a:p>
+        </p:txBody>
+      </p:sp>
+      <p:sp useBgFill="1">
+        <p:nvSpPr>
+          <p:cNvPr id="43" name="Rectangle 30">
+            <a:extLst>
+              <a:ext uri="{FF2B5EF4-FFF2-40B4-BE49-F238E27FC236}">
+                <a16:creationId xmlns:a16="http://schemas.microsoft.com/office/drawing/2014/main" id="{68AF5748-FED8-45BA-8631-26D1D10F3246}"/>
+              </a:ext>
+              <a:ext uri="{C183D7F6-B498-43B3-948B-1728B52AA6E4}">
+                <adec:decorative xmlns:adec="http://schemas.microsoft.com/office/drawing/2017/decorative" val="1"/>
+              </a:ext>
+            </a:extLst>
+          </p:cNvPr>
+          <p:cNvSpPr>
+            <a:spLocks noGrp="1" noRot="1" noChangeAspect="1" noMove="1" noResize="1" noEditPoints="1" noAdjustHandles="1" noChangeArrowheads="1" noChangeShapeType="1" noTextEdit="1"/>
+          </p:cNvSpPr>
+          <p:nvPr>
+            <p:extLst>
+              <p:ext uri="{386F3935-93C4-4BCD-93E2-E3B085C9AB24}">
+                <p16:designElem xmlns:p16="http://schemas.microsoft.com/office/powerpoint/2015/main" val="1"/>
+              </p:ext>
+            </p:extLst>
+          </p:nvPr>
+        </p:nvSpPr>
+        <p:spPr>
+          <a:xfrm>
+            <a:off x="0" y="0"/>
+            <a:ext cx="12192000" cy="6858000"/>
+          </a:xfrm>
+          <a:prstGeom prst="rect">
+            <a:avLst/>
+          </a:prstGeom>
+          <a:ln>
+            <a:noFill/>
+          </a:ln>
+        </p:spPr>
+        <p:style>
+          <a:lnRef idx="2">
+            <a:schemeClr val="accent1">
+              <a:shade val="50000"/>
+            </a:schemeClr>
+          </a:lnRef>
+          <a:fillRef idx="1">
+            <a:schemeClr val="accent1"/>
+          </a:fillRef>
+          <a:effectRef idx="0">
+            <a:schemeClr val="accent1"/>
+          </a:effectRef>
+          <a:fontRef idx="minor">
+            <a:schemeClr val="lt1"/>
+          </a:fontRef>
+        </p:style>
+        <p:txBody>
+          <a:bodyPr rtlCol="0" anchor="ctr"/>
+          <a:lstStyle/>
+          <a:p>
+            <a:pPr algn="ctr"/>
+            <a:endParaRPr lang="en-US"/>
+          </a:p>
+        </p:txBody>
+      </p:sp>
+      <p:sp>
+        <p:nvSpPr>
+          <p:cNvPr id="2" name="Title 1">
+            <a:extLst>
+              <a:ext uri="{FF2B5EF4-FFF2-40B4-BE49-F238E27FC236}">
+                <a16:creationId xmlns:a16="http://schemas.microsoft.com/office/drawing/2014/main" id="{54ADA480-6AB0-844F-9E88-B8120036CC75}"/>
+              </a:ext>
+            </a:extLst>
+          </p:cNvPr>
+          <p:cNvSpPr>
+            <a:spLocks noGrp="1"/>
+          </p:cNvSpPr>
+          <p:nvPr>
+            <p:ph type="title"/>
+          </p:nvPr>
+        </p:nvSpPr>
+        <p:spPr>
+          <a:xfrm>
+            <a:off x="477981" y="1122363"/>
+            <a:ext cx="4023360" cy="3204134"/>
+          </a:xfrm>
+        </p:spPr>
+        <p:txBody>
+          <a:bodyPr vert="horz" lIns="91440" tIns="45720" rIns="91440" bIns="45720" rtlCol="0" anchor="b">
+            <a:normAutofit/>
+          </a:bodyPr>
+          <a:lstStyle/>
+          <a:p>
+            <a:r>
+              <a:rPr lang="en-US" sz="3700" b="1" dirty="0"/>
+              <a:t>K-Means (III): </a:t>
+            </a:r>
+            <a:br>
+              <a:rPr lang="en-US" sz="3700" b="1" dirty="0"/>
+            </a:br>
+            <a:r>
+              <a:rPr lang="en-US" sz="3700" dirty="0" err="1"/>
+              <a:t>Barock</a:t>
+            </a:r>
+            <a:r>
+              <a:rPr lang="en-US" sz="3700" dirty="0"/>
+              <a:t>/</a:t>
+            </a:r>
+            <a:r>
+              <a:rPr lang="en-US" sz="3700" dirty="0" err="1"/>
+              <a:t>Realismus</a:t>
+            </a:r>
+            <a:endParaRPr lang="en-US" sz="3700" dirty="0"/>
+          </a:p>
+        </p:txBody>
+      </p:sp>
+      <p:sp>
+        <p:nvSpPr>
+          <p:cNvPr id="44" name="Rectangle 32">
+            <a:extLst>
+              <a:ext uri="{FF2B5EF4-FFF2-40B4-BE49-F238E27FC236}">
+                <a16:creationId xmlns:a16="http://schemas.microsoft.com/office/drawing/2014/main" id="{AF2F604E-43BE-4DC3-B983-E071523364F8}"/>
+              </a:ext>
+              <a:ext uri="{C183D7F6-B498-43B3-948B-1728B52AA6E4}">
+                <adec:decorative xmlns:adec="http://schemas.microsoft.com/office/drawing/2017/decorative" val="1"/>
+              </a:ext>
+            </a:extLst>
+          </p:cNvPr>
+          <p:cNvSpPr>
+            <a:spLocks noGrp="1" noRot="1" noChangeAspect="1" noMove="1" noResize="1" noEditPoints="1" noAdjustHandles="1" noChangeArrowheads="1" noChangeShapeType="1" noTextEdit="1"/>
+          </p:cNvSpPr>
+          <p:nvPr>
+            <p:extLst>
+              <p:ext uri="{386F3935-93C4-4BCD-93E2-E3B085C9AB24}">
+                <p16:designElem xmlns:p16="http://schemas.microsoft.com/office/powerpoint/2015/main" val="1"/>
+              </p:ext>
+            </p:extLst>
+          </p:nvPr>
+        </p:nvSpPr>
+        <p:spPr>
+          <a:xfrm rot="5400000">
+            <a:off x="759921" y="346791"/>
+            <a:ext cx="146304" cy="704088"/>
+          </a:xfrm>
+          <a:prstGeom prst="rect">
+            <a:avLst/>
+          </a:prstGeom>
+          <a:solidFill>
+            <a:schemeClr val="accent1"/>
+          </a:solidFill>
+          <a:ln>
+            <a:noFill/>
+          </a:ln>
+        </p:spPr>
+        <p:style>
+          <a:lnRef idx="2">
+            <a:schemeClr val="accent1">
+              <a:shade val="50000"/>
+            </a:schemeClr>
+          </a:lnRef>
+          <a:fillRef idx="1">
+            <a:schemeClr val="accent1"/>
+          </a:fillRef>
+          <a:effectRef idx="0">
+            <a:schemeClr val="accent1"/>
+          </a:effectRef>
+          <a:fontRef idx="minor">
+            <a:schemeClr val="lt1"/>
+          </a:fontRef>
+        </p:style>
+        <p:txBody>
+          <a:bodyPr rtlCol="0" anchor="ctr"/>
+          <a:lstStyle/>
+          <a:p>
+            <a:pPr marL="0" marR="0" lvl="0" indent="0" algn="ctr" defTabSz="914400" rtl="0" eaLnBrk="1" fontAlgn="auto" latinLnBrk="0" hangingPunct="1">
+              <a:lnSpc>
+                <a:spcPct val="100000"/>
+              </a:lnSpc>
+              <a:spcBef>
+                <a:spcPts val="0"/>
+              </a:spcBef>
+              <a:spcAft>
+                <a:spcPts val="0"/>
+              </a:spcAft>
+              <a:buClrTx/>
+              <a:buSzTx/>
+              <a:buFontTx/>
+              <a:buNone/>
+              <a:tabLst/>
+              <a:defRPr/>
+            </a:pPr>
+            <a:endParaRPr kumimoji="0" lang="en-US" sz="1800" b="0" i="0" u="none" strike="noStrike" kern="1200" cap="none" spc="0" normalizeH="0" baseline="0" noProof="0">
+              <a:ln>
+                <a:noFill/>
+              </a:ln>
+              <a:solidFill>
+                <a:prstClr val="white"/>
+              </a:solidFill>
+              <a:effectLst/>
+              <a:uLnTx/>
+              <a:uFillTx/>
+              <a:latin typeface="Calibri" panose="020F0502020204030204"/>
+              <a:ea typeface="+mn-ea"/>
+              <a:cs typeface="+mn-cs"/>
+            </a:endParaRPr>
+          </a:p>
+        </p:txBody>
+      </p:sp>
+      <p:sp>
+        <p:nvSpPr>
+          <p:cNvPr id="45" name="Rectangle 34">
+            <a:extLst>
+              <a:ext uri="{FF2B5EF4-FFF2-40B4-BE49-F238E27FC236}">
+                <a16:creationId xmlns:a16="http://schemas.microsoft.com/office/drawing/2014/main" id="{08C9B587-E65E-4B52-B37C-ABEBB6E87928}"/>
+              </a:ext>
+              <a:ext uri="{C183D7F6-B498-43B3-948B-1728B52AA6E4}">
+                <adec:decorative xmlns:adec="http://schemas.microsoft.com/office/drawing/2017/decorative" val="1"/>
+              </a:ext>
+            </a:extLst>
+          </p:cNvPr>
+          <p:cNvSpPr>
+            <a:spLocks noGrp="1" noRot="1" noChangeAspect="1" noMove="1" noResize="1" noEditPoints="1" noAdjustHandles="1" noChangeArrowheads="1" noChangeShapeType="1" noTextEdit="1"/>
+          </p:cNvSpPr>
+          <p:nvPr>
+            <p:extLst>
+              <p:ext uri="{386F3935-93C4-4BCD-93E2-E3B085C9AB24}">
+                <p16:designElem xmlns:p16="http://schemas.microsoft.com/office/powerpoint/2015/main" val="1"/>
+              </p:ext>
+            </p:extLst>
+          </p:nvPr>
+        </p:nvSpPr>
+        <p:spPr>
+          <a:xfrm>
+            <a:off x="481029" y="4546920"/>
+            <a:ext cx="4023360" cy="18288"/>
+          </a:xfrm>
+          <a:prstGeom prst="rect">
+            <a:avLst/>
+          </a:prstGeom>
+          <a:solidFill>
+            <a:schemeClr val="tx2">
+              <a:lumMod val="25000"/>
+              <a:lumOff val="75000"/>
+            </a:schemeClr>
+          </a:solidFill>
+          <a:ln w="3175">
+            <a:noFill/>
+          </a:ln>
+          <a:effectLst/>
+        </p:spPr>
+        <p:style>
+          <a:lnRef idx="2">
+            <a:schemeClr val="accent1">
+              <a:shade val="50000"/>
+            </a:schemeClr>
+          </a:lnRef>
+          <a:fillRef idx="1">
+            <a:schemeClr val="accent1"/>
+          </a:fillRef>
+          <a:effectRef idx="0">
+            <a:schemeClr val="accent1"/>
+          </a:effectRef>
+          <a:fontRef idx="minor">
+            <a:schemeClr val="lt1"/>
+          </a:fontRef>
+        </p:style>
+        <p:txBody>
+          <a:bodyPr rtlCol="0" anchor="ctr"/>
+          <a:lstStyle/>
+          <a:p>
+            <a:pPr marL="0" marR="0" lvl="0" indent="0" algn="ctr" defTabSz="914400" rtl="0" eaLnBrk="1" fontAlgn="auto" latinLnBrk="0" hangingPunct="1">
+              <a:lnSpc>
+                <a:spcPct val="100000"/>
+              </a:lnSpc>
+              <a:spcBef>
+                <a:spcPts val="0"/>
+              </a:spcBef>
+              <a:spcAft>
+                <a:spcPts val="0"/>
+              </a:spcAft>
+              <a:buClrTx/>
+              <a:buSzTx/>
+              <a:buFontTx/>
+              <a:buNone/>
+              <a:tabLst/>
+              <a:defRPr/>
+            </a:pPr>
+            <a:endParaRPr kumimoji="0" lang="en-US" sz="1800" b="0" i="0" u="none" strike="noStrike" kern="1200" cap="none" spc="0" normalizeH="0" baseline="0" noProof="0">
+              <a:ln>
+                <a:noFill/>
+              </a:ln>
+              <a:solidFill>
+                <a:prstClr val="white"/>
+              </a:solidFill>
+              <a:effectLst/>
+              <a:uLnTx/>
+              <a:uFillTx/>
+              <a:latin typeface="Calibri" panose="020F0502020204030204"/>
+              <a:ea typeface="+mn-ea"/>
+              <a:cs typeface="+mn-cs"/>
+            </a:endParaRPr>
+          </a:p>
+        </p:txBody>
+      </p:sp>
+      <p:sp>
+        <p:nvSpPr>
+          <p:cNvPr id="6" name="TextBox 5">
+            <a:extLst>
+              <a:ext uri="{FF2B5EF4-FFF2-40B4-BE49-F238E27FC236}">
+                <a16:creationId xmlns:a16="http://schemas.microsoft.com/office/drawing/2014/main" id="{90F669C5-0123-2348-A259-7BE0C33F2448}"/>
+              </a:ext>
+            </a:extLst>
+          </p:cNvPr>
+          <p:cNvSpPr txBox="1"/>
+          <p:nvPr/>
+        </p:nvSpPr>
+        <p:spPr>
+          <a:xfrm>
+            <a:off x="578652" y="4814888"/>
+            <a:ext cx="3736173" cy="1077218"/>
+          </a:xfrm>
+          <a:prstGeom prst="rect">
+            <a:avLst/>
+          </a:prstGeom>
+          <a:noFill/>
+        </p:spPr>
+        <p:txBody>
+          <a:bodyPr wrap="square" rtlCol="0">
+            <a:spAutoFit/>
+          </a:bodyPr>
+          <a:lstStyle/>
+          <a:p>
+            <a:r>
+              <a:rPr lang="de-DE" sz="3200" b="1" dirty="0" err="1"/>
+              <a:t>ari</a:t>
+            </a:r>
+            <a:r>
+              <a:rPr lang="de-DE" sz="3200" dirty="0"/>
+              <a:t>: 0.83</a:t>
+            </a:r>
+          </a:p>
+          <a:p>
+            <a:r>
+              <a:rPr lang="de-DE" sz="3200" b="1" dirty="0" err="1"/>
+              <a:t>vm</a:t>
+            </a:r>
+            <a:r>
+              <a:rPr lang="de-DE" sz="3200" dirty="0"/>
+              <a:t>: 0.71 </a:t>
+            </a:r>
+          </a:p>
+        </p:txBody>
+      </p:sp>
+      <p:pic>
+        <p:nvPicPr>
+          <p:cNvPr id="11" name="Picture 10" descr="A screenshot of a cell phone&#10;&#10;Description automatically generated">
+            <a:extLst>
+              <a:ext uri="{FF2B5EF4-FFF2-40B4-BE49-F238E27FC236}">
+                <a16:creationId xmlns:a16="http://schemas.microsoft.com/office/drawing/2014/main" id="{798D8B65-E62C-FC4C-9F4F-F24D281658F8}"/>
+              </a:ext>
+            </a:extLst>
+          </p:cNvPr>
+          <p:cNvPicPr>
+            <a:picLocks noChangeAspect="1"/>
+          </p:cNvPicPr>
+          <p:nvPr/>
+        </p:nvPicPr>
+        <p:blipFill rotWithShape="1">
+          <a:blip r:embed="rId3"/>
+          <a:srcRect l="10590" t="5472" r="16840" b="10324"/>
+          <a:stretch/>
+        </p:blipFill>
+        <p:spPr>
+          <a:xfrm>
+            <a:off x="4625629" y="461825"/>
+            <a:ext cx="7439034" cy="5934350"/>
+          </a:xfrm>
+          <a:prstGeom prst="rect">
+            <a:avLst/>
+          </a:prstGeom>
+        </p:spPr>
+      </p:pic>
+    </p:spTree>
+    <p:extLst>
+      <p:ext uri="{BB962C8B-B14F-4D97-AF65-F5344CB8AC3E}">
+        <p14:creationId xmlns:p14="http://schemas.microsoft.com/office/powerpoint/2010/main" val="458308752"/>
+      </p:ext>
+    </p:extLst>
+  </p:cSld>
+  <p:clrMapOvr>
+    <a:masterClrMapping/>
+  </p:clrMapOvr>
+</p:sld>
+</file>
+
+<file path=ppt/slides/slide3.xml><?xml version="1.0" encoding="utf-8"?>
+<p:sld xmlns:a="http://schemas.openxmlformats.org/drawingml/2006/main" xmlns:r="http://schemas.openxmlformats.org/officeDocument/2006/relationships" xmlns:p="http://schemas.openxmlformats.org/presentationml/2006/main">
+  <p:cSld>
+    <p:spTree>
+      <p:nvGrpSpPr>
+        <p:cNvPr id="1" name=""/>
+        <p:cNvGrpSpPr/>
+        <p:nvPr/>
+      </p:nvGrpSpPr>
+      <p:grpSpPr>
+        <a:xfrm>
+          <a:off x="0" y="0"/>
+          <a:ext cx="0" cy="0"/>
+          <a:chOff x="0" y="0"/>
+          <a:chExt cx="0" cy="0"/>
+        </a:xfrm>
+      </p:grpSpPr>
+      <p:sp>
+        <p:nvSpPr>
+          <p:cNvPr id="4" name="Title 3">
+            <a:extLst>
+              <a:ext uri="{FF2B5EF4-FFF2-40B4-BE49-F238E27FC236}">
+                <a16:creationId xmlns:a16="http://schemas.microsoft.com/office/drawing/2014/main" id="{02AE6012-7D63-EA4D-B957-FE20015B7973}"/>
+              </a:ext>
+            </a:extLst>
+          </p:cNvPr>
+          <p:cNvSpPr>
+            <a:spLocks noGrp="1"/>
+          </p:cNvSpPr>
+          <p:nvPr>
+            <p:ph type="title"/>
+          </p:nvPr>
+        </p:nvSpPr>
+        <p:spPr/>
+        <p:txBody>
+          <a:bodyPr/>
+          <a:lstStyle/>
+          <a:p>
+            <a:r>
+              <a:rPr lang="de-DE" b="1" dirty="0"/>
+              <a:t>1.  Epochenbegriff und –	</a:t>
+            </a:r>
+            <a:r>
+              <a:rPr lang="de-DE" b="1" dirty="0" err="1"/>
+              <a:t>einteilung</a:t>
+            </a:r>
+            <a:endParaRPr lang="de-DE" dirty="0"/>
+          </a:p>
+        </p:txBody>
+      </p:sp>
+    </p:spTree>
+    <p:extLst>
+      <p:ext uri="{BB962C8B-B14F-4D97-AF65-F5344CB8AC3E}">
+        <p14:creationId xmlns:p14="http://schemas.microsoft.com/office/powerpoint/2010/main" val="835330337"/>
+      </p:ext>
+    </p:extLst>
+  </p:cSld>
+  <p:clrMapOvr>
+    <a:masterClrMapping/>
+  </p:clrMapOvr>
+</p:sld>
+</file>
+
+<file path=ppt/slides/slide30.xml><?xml version="1.0" encoding="utf-8"?>
+<p:sld xmlns:a="http://schemas.openxmlformats.org/drawingml/2006/main" xmlns:r="http://schemas.openxmlformats.org/officeDocument/2006/relationships" xmlns:p="http://schemas.openxmlformats.org/presentationml/2006/main">
+  <p:cSld>
+    <p:spTree>
+      <p:nvGrpSpPr>
+        <p:cNvPr id="1" name=""/>
+        <p:cNvGrpSpPr/>
+        <p:nvPr/>
+      </p:nvGrpSpPr>
+      <p:grpSpPr>
+        <a:xfrm>
+          <a:off x="0" y="0"/>
+          <a:ext cx="0" cy="0"/>
+          <a:chOff x="0" y="0"/>
+          <a:chExt cx="0" cy="0"/>
+        </a:xfrm>
+      </p:grpSpPr>
+      <p:sp>
+        <p:nvSpPr>
+          <p:cNvPr id="5" name="Title 4">
+            <a:extLst>
+              <a:ext uri="{FF2B5EF4-FFF2-40B4-BE49-F238E27FC236}">
+                <a16:creationId xmlns:a16="http://schemas.microsoft.com/office/drawing/2014/main" id="{3E3FFB06-5C6D-5E47-86E7-69D84771AB3B}"/>
+              </a:ext>
+            </a:extLst>
+          </p:cNvPr>
+          <p:cNvSpPr>
+            <a:spLocks noGrp="1"/>
+          </p:cNvSpPr>
+          <p:nvPr>
+            <p:ph type="title"/>
+          </p:nvPr>
+        </p:nvSpPr>
+        <p:spPr/>
+        <p:txBody>
+          <a:bodyPr/>
+          <a:lstStyle/>
+          <a:p>
+            <a:r>
+              <a:rPr lang="de-DE" dirty="0"/>
+              <a:t>Weitere </a:t>
+            </a:r>
+            <a:r>
+              <a:rPr lang="de-DE" dirty="0" err="1"/>
+              <a:t>To</a:t>
+            </a:r>
+            <a:r>
+              <a:rPr lang="de-DE" dirty="0"/>
+              <a:t>-Dos:</a:t>
+            </a:r>
+          </a:p>
+        </p:txBody>
+      </p:sp>
+      <p:sp>
+        <p:nvSpPr>
+          <p:cNvPr id="6" name="Content Placeholder 5">
+            <a:extLst>
+              <a:ext uri="{FF2B5EF4-FFF2-40B4-BE49-F238E27FC236}">
+                <a16:creationId xmlns:a16="http://schemas.microsoft.com/office/drawing/2014/main" id="{D2A8664A-FE4A-3445-8CA1-BF179C75CBDA}"/>
+              </a:ext>
+            </a:extLst>
+          </p:cNvPr>
+          <p:cNvSpPr>
+            <a:spLocks noGrp="1"/>
+          </p:cNvSpPr>
+          <p:nvPr>
+            <p:ph idx="1"/>
+          </p:nvPr>
+        </p:nvSpPr>
+        <p:spPr/>
+        <p:txBody>
+          <a:bodyPr>
+            <a:normAutofit lnSpcReduction="10000"/>
+          </a:bodyPr>
+          <a:lstStyle/>
+          <a:p>
+            <a:r>
+              <a:rPr lang="de-DE" dirty="0"/>
+              <a:t>Andere Art der Zusammenfassung von Gedichten: Dichter mit mehreren Epochenzuweisungen nach diesen aufteilen</a:t>
+            </a:r>
+          </a:p>
+          <a:p>
+            <a:r>
+              <a:rPr lang="de-DE" b="1" dirty="0"/>
+              <a:t>Noise </a:t>
+            </a:r>
+            <a:r>
+              <a:rPr lang="de-DE" dirty="0"/>
+              <a:t>entdecken durch Hierarchisches Clustering inkl. Epochenzuteilungen</a:t>
+            </a:r>
+          </a:p>
+          <a:p>
+            <a:r>
+              <a:rPr lang="de-DE" dirty="0">
+                <a:sym typeface="Wingdings" pitchFamily="2" charset="2"/>
+              </a:rPr>
+              <a:t>Korpus normalisieren und Experimente durchführen</a:t>
+            </a:r>
+            <a:endParaRPr lang="de-DE" dirty="0"/>
+          </a:p>
+          <a:p>
+            <a:r>
+              <a:rPr lang="de-DE" dirty="0">
+                <a:sym typeface="Wingdings" pitchFamily="2" charset="2"/>
+              </a:rPr>
+              <a:t>Analyse von Gedichten/Dichter, die sich gut </a:t>
+            </a:r>
+            <a:r>
+              <a:rPr lang="de-DE" dirty="0" err="1">
+                <a:sym typeface="Wingdings" pitchFamily="2" charset="2"/>
+              </a:rPr>
+              <a:t>clustern</a:t>
+            </a:r>
+            <a:r>
+              <a:rPr lang="de-DE" dirty="0">
+                <a:sym typeface="Wingdings" pitchFamily="2" charset="2"/>
+              </a:rPr>
+              <a:t> lassen</a:t>
+            </a:r>
+          </a:p>
+          <a:p>
+            <a:r>
+              <a:rPr lang="de-DE" dirty="0">
+                <a:sym typeface="Wingdings" pitchFamily="2" charset="2"/>
+              </a:rPr>
+              <a:t>Topic </a:t>
+            </a:r>
+            <a:r>
+              <a:rPr lang="de-DE" dirty="0" err="1">
+                <a:sym typeface="Wingdings" pitchFamily="2" charset="2"/>
+              </a:rPr>
+              <a:t>Modelling</a:t>
+            </a:r>
+            <a:r>
+              <a:rPr lang="de-DE" dirty="0">
+                <a:sym typeface="Wingdings" pitchFamily="2" charset="2"/>
+              </a:rPr>
+              <a:t> anwenden</a:t>
+            </a:r>
+            <a:endParaRPr lang="de-DE" dirty="0"/>
+          </a:p>
+        </p:txBody>
+      </p:sp>
+    </p:spTree>
+    <p:extLst>
+      <p:ext uri="{BB962C8B-B14F-4D97-AF65-F5344CB8AC3E}">
+        <p14:creationId xmlns:p14="http://schemas.microsoft.com/office/powerpoint/2010/main" val="2994903066"/>
+      </p:ext>
+    </p:extLst>
+  </p:cSld>
+  <p:clrMapOvr>
+    <a:masterClrMapping/>
+  </p:clrMapOvr>
+</p:sld>
+</file>
+
+<file path=ppt/slides/slide31.xml><?xml version="1.0" encoding="utf-8"?>
 <p:sld xmlns:a="http://schemas.openxmlformats.org/drawingml/2006/main" xmlns:r="http://schemas.openxmlformats.org/officeDocument/2006/relationships" xmlns:p="http://schemas.openxmlformats.org/presentationml/2006/main" show="0">
   <p:cSld>
     <p:spTree>
@@ -15233,7 +18213,7 @@
 </p:sld>
 </file>
 
-<file path=ppt/slides/slide27.xml><?xml version="1.0" encoding="utf-8"?>
+<file path=ppt/slides/slide32.xml><?xml version="1.0" encoding="utf-8"?>
 <p:sld xmlns:a="http://schemas.openxmlformats.org/drawingml/2006/main" xmlns:r="http://schemas.openxmlformats.org/officeDocument/2006/relationships" xmlns:p="http://schemas.openxmlformats.org/presentationml/2006/main" show="0">
   <p:cSld>
     <p:bg>
@@ -15719,156 +18699,7 @@
 </p:sld>
 </file>
 
-<file path=ppt/slides/slide28.xml><?xml version="1.0" encoding="utf-8"?>
-<p:sld xmlns:a="http://schemas.openxmlformats.org/drawingml/2006/main" xmlns:r="http://schemas.openxmlformats.org/officeDocument/2006/relationships" xmlns:p="http://schemas.openxmlformats.org/presentationml/2006/main">
-  <p:cSld>
-    <p:spTree>
-      <p:nvGrpSpPr>
-        <p:cNvPr id="1" name=""/>
-        <p:cNvGrpSpPr/>
-        <p:nvPr/>
-      </p:nvGrpSpPr>
-      <p:grpSpPr>
-        <a:xfrm>
-          <a:off x="0" y="0"/>
-          <a:ext cx="0" cy="0"/>
-          <a:chOff x="0" y="0"/>
-          <a:chExt cx="0" cy="0"/>
-        </a:xfrm>
-      </p:grpSpPr>
-      <p:sp>
-        <p:nvSpPr>
-          <p:cNvPr id="5" name="Title 4">
-            <a:extLst>
-              <a:ext uri="{FF2B5EF4-FFF2-40B4-BE49-F238E27FC236}">
-                <a16:creationId xmlns:a16="http://schemas.microsoft.com/office/drawing/2014/main" id="{3E3FFB06-5C6D-5E47-86E7-69D84771AB3B}"/>
-              </a:ext>
-            </a:extLst>
-          </p:cNvPr>
-          <p:cNvSpPr>
-            <a:spLocks noGrp="1"/>
-          </p:cNvSpPr>
-          <p:nvPr>
-            <p:ph type="title"/>
-          </p:nvPr>
-        </p:nvSpPr>
-        <p:spPr/>
-        <p:txBody>
-          <a:bodyPr/>
-          <a:lstStyle/>
-          <a:p>
-            <a:r>
-              <a:rPr lang="de-DE" dirty="0"/>
-              <a:t>Weitere </a:t>
-            </a:r>
-            <a:r>
-              <a:rPr lang="de-DE" dirty="0" err="1"/>
-              <a:t>To</a:t>
-            </a:r>
-            <a:r>
-              <a:rPr lang="de-DE" dirty="0"/>
-              <a:t>-Dos:</a:t>
-            </a:r>
-          </a:p>
-        </p:txBody>
-      </p:sp>
-      <p:sp>
-        <p:nvSpPr>
-          <p:cNvPr id="6" name="Content Placeholder 5">
-            <a:extLst>
-              <a:ext uri="{FF2B5EF4-FFF2-40B4-BE49-F238E27FC236}">
-                <a16:creationId xmlns:a16="http://schemas.microsoft.com/office/drawing/2014/main" id="{D2A8664A-FE4A-3445-8CA1-BF179C75CBDA}"/>
-              </a:ext>
-            </a:extLst>
-          </p:cNvPr>
-          <p:cNvSpPr>
-            <a:spLocks noGrp="1"/>
-          </p:cNvSpPr>
-          <p:nvPr>
-            <p:ph idx="1"/>
-          </p:nvPr>
-        </p:nvSpPr>
-        <p:spPr/>
-        <p:txBody>
-          <a:bodyPr>
-            <a:normAutofit lnSpcReduction="10000"/>
-          </a:bodyPr>
-          <a:lstStyle/>
-          <a:p>
-            <a:r>
-              <a:rPr lang="de-DE" b="1" dirty="0"/>
-              <a:t>Noise </a:t>
-            </a:r>
-            <a:r>
-              <a:rPr lang="de-DE" dirty="0"/>
-              <a:t>entdecken durch Hierarchisches Clustering inkl. Epochenzuteilungen</a:t>
-            </a:r>
-          </a:p>
-          <a:p>
-            <a:r>
-              <a:rPr lang="de-DE" dirty="0"/>
-              <a:t>Gedichte </a:t>
-            </a:r>
-            <a:r>
-              <a:rPr lang="de-DE" b="1" dirty="0"/>
-              <a:t>anreichern</a:t>
-            </a:r>
-            <a:r>
-              <a:rPr lang="de-DE" dirty="0"/>
-              <a:t> </a:t>
-            </a:r>
-            <a:r>
-              <a:rPr lang="de-DE" dirty="0">
-                <a:sym typeface="Wingdings" pitchFamily="2" charset="2"/>
-              </a:rPr>
-              <a:t> Gedichte eines Jahres eines Dichter in einem Gedicht zusammenfassen</a:t>
-            </a:r>
-          </a:p>
-          <a:p>
-            <a:r>
-              <a:rPr lang="de-DE" dirty="0">
-                <a:sym typeface="Wingdings" pitchFamily="2" charset="2"/>
-              </a:rPr>
-              <a:t>Problematische Gedichte finden (Umkehrschluss: Gedichte/Dichter finden, die sich gut </a:t>
-            </a:r>
-            <a:r>
-              <a:rPr lang="de-DE" dirty="0" err="1">
-                <a:sym typeface="Wingdings" pitchFamily="2" charset="2"/>
-              </a:rPr>
-              <a:t>clustern</a:t>
-            </a:r>
-            <a:r>
-              <a:rPr lang="de-DE" dirty="0">
-                <a:sym typeface="Wingdings" pitchFamily="2" charset="2"/>
-              </a:rPr>
-              <a:t> lassen)</a:t>
-            </a:r>
-          </a:p>
-          <a:p>
-            <a:r>
-              <a:rPr lang="de-DE" dirty="0">
-                <a:sym typeface="Wingdings" pitchFamily="2" charset="2"/>
-              </a:rPr>
-              <a:t>Korpus normalisieren und Experimente durchführen</a:t>
-            </a:r>
-            <a:endParaRPr lang="de-DE" dirty="0"/>
-          </a:p>
-        </p:txBody>
-      </p:sp>
-    </p:spTree>
-    <p:extLst>
-      <p:ext uri="{BB962C8B-B14F-4D97-AF65-F5344CB8AC3E}">
-        <p14:creationId xmlns:p14="http://schemas.microsoft.com/office/powerpoint/2010/main" val="2994903066"/>
-      </p:ext>
-    </p:extLst>
-  </p:cSld>
-  <p:clrMapOvr>
-    <a:masterClrMapping/>
-  </p:clrMapOvr>
-</p:sld>
-</file>
-
-<file path=ppt/slides/slide29.xml><?xml version="1.0" encoding="utf-8"?>
+<file path=ppt/slides/slide33.xml><?xml version="1.0" encoding="utf-8"?>
 <p:sld xmlns:a="http://schemas.openxmlformats.org/drawingml/2006/main" xmlns:r="http://schemas.openxmlformats.org/officeDocument/2006/relationships" xmlns:p="http://schemas.openxmlformats.org/presentationml/2006/main" show="0">
   <p:cSld>
     <p:spTree>
@@ -17038,70 +19869,7 @@
 </p:sld>
 </file>
 
-<file path=ppt/slides/slide3.xml><?xml version="1.0" encoding="utf-8"?>
-<p:sld xmlns:a="http://schemas.openxmlformats.org/drawingml/2006/main" xmlns:r="http://schemas.openxmlformats.org/officeDocument/2006/relationships" xmlns:p="http://schemas.openxmlformats.org/presentationml/2006/main">
-  <p:cSld>
-    <p:spTree>
-      <p:nvGrpSpPr>
-        <p:cNvPr id="1" name=""/>
-        <p:cNvGrpSpPr/>
-        <p:nvPr/>
-      </p:nvGrpSpPr>
-      <p:grpSpPr>
-        <a:xfrm>
-          <a:off x="0" y="0"/>
-          <a:ext cx="0" cy="0"/>
-          <a:chOff x="0" y="0"/>
-          <a:chExt cx="0" cy="0"/>
-        </a:xfrm>
-      </p:grpSpPr>
-      <p:sp>
-        <p:nvSpPr>
-          <p:cNvPr id="4" name="Title 3">
-            <a:extLst>
-              <a:ext uri="{FF2B5EF4-FFF2-40B4-BE49-F238E27FC236}">
-                <a16:creationId xmlns:a16="http://schemas.microsoft.com/office/drawing/2014/main" id="{02AE6012-7D63-EA4D-B957-FE20015B7973}"/>
-              </a:ext>
-            </a:extLst>
-          </p:cNvPr>
-          <p:cNvSpPr>
-            <a:spLocks noGrp="1"/>
-          </p:cNvSpPr>
-          <p:nvPr>
-            <p:ph type="title"/>
-          </p:nvPr>
-        </p:nvSpPr>
-        <p:spPr/>
-        <p:txBody>
-          <a:bodyPr/>
-          <a:lstStyle/>
-          <a:p>
-            <a:r>
-              <a:rPr lang="de-DE" b="1" dirty="0"/>
-              <a:t>1.  Epochenbegriff und –	</a:t>
-            </a:r>
-            <a:r>
-              <a:rPr lang="de-DE" b="1" dirty="0" err="1"/>
-              <a:t>einteilung</a:t>
-            </a:r>
-            <a:endParaRPr lang="de-DE" dirty="0"/>
-          </a:p>
-        </p:txBody>
-      </p:sp>
-    </p:spTree>
-    <p:extLst>
-      <p:ext uri="{BB962C8B-B14F-4D97-AF65-F5344CB8AC3E}">
-        <p14:creationId xmlns:p14="http://schemas.microsoft.com/office/powerpoint/2010/main" val="835330337"/>
-      </p:ext>
-    </p:extLst>
-  </p:cSld>
-  <p:clrMapOvr>
-    <a:masterClrMapping/>
-  </p:clrMapOvr>
-</p:sld>
-</file>
-
-<file path=ppt/slides/slide30.xml><?xml version="1.0" encoding="utf-8"?>
+<file path=ppt/slides/slide34.xml><?xml version="1.0" encoding="utf-8"?>
 <p:sld xmlns:a="http://schemas.openxmlformats.org/drawingml/2006/main" xmlns:r="http://schemas.openxmlformats.org/officeDocument/2006/relationships" xmlns:p="http://schemas.openxmlformats.org/presentationml/2006/main">
   <p:cSld>
     <p:spTree>
@@ -18121,17 +20889,24 @@
         </p:nvSpPr>
         <p:spPr/>
         <p:txBody>
-          <a:bodyPr/>
+          <a:bodyPr>
+            <a:normAutofit fontScale="92500"/>
+          </a:bodyPr>
           <a:lstStyle/>
           <a:p>
             <a:r>
               <a:rPr lang="de-DE" dirty="0"/>
-              <a:t>Jahre sind </a:t>
-            </a:r>
-            <a:r>
-              <a:rPr lang="de-DE" b="1" dirty="0"/>
-              <a:t>Erstveröffentlichungsjahr</a:t>
-            </a:r>
+              <a:t>Jahre </a:t>
+            </a:r>
+            <a:r>
+              <a:rPr lang="de-DE"/>
+              <a:t>sind </a:t>
+            </a:r>
+            <a:r>
+              <a:rPr lang="de-DE" b="1"/>
+              <a:t>Erstveröffentlichungsjahre</a:t>
+            </a:r>
+            <a:endParaRPr lang="de-DE" b="1" dirty="0"/>
           </a:p>
           <a:p>
             <a:r>

</xml_diff>